<commit_message>
Made top & bottom 10 graphs nicer and updated their pictures
</commit_message>
<xml_diff>
--- a/CSC 583 Project - Barrett & Bruggemann.pptx
+++ b/CSC 583 Project - Barrett & Bruggemann.pptx
@@ -123,6 +123,11 @@
       </a:defRPr>
     </a:lvl9pPr>
   </p:defaultTextStyle>
+  <p:extLst>
+    <p:ext uri="{EFAFB233-063F-42B5-8137-9DF3F51BA10A}">
+      <p15:sldGuideLst xmlns:p15="http://schemas.microsoft.com/office/powerpoint/2012/main"/>
+    </p:ext>
+  </p:extLst>
 </p:presentation>
 </file>
 
@@ -208,7 +213,7 @@
           <a:p>
             <a:fld id="{A5008EC1-E643-4167-848A-F26CABA7E716}" type="datetimeFigureOut">
               <a:rPr lang="en-US" smtClean="0"/>
-              <a:t>5/1/2021</a:t>
+              <a:t>5/2/2021</a:t>
             </a:fld>
             <a:endParaRPr lang="en-US"/>
           </a:p>
@@ -562,6 +567,99 @@
 </p:notes>
 </file>
 
+<file path=ppt/notesSlides/notesSlide2.xml><?xml version="1.0" encoding="utf-8"?>
+<p:notes xmlns:a="http://schemas.openxmlformats.org/drawingml/2006/main" xmlns:r="http://schemas.openxmlformats.org/officeDocument/2006/relationships" xmlns:p="http://schemas.openxmlformats.org/presentationml/2006/main">
+  <p:cSld>
+    <p:spTree>
+      <p:nvGrpSpPr>
+        <p:cNvPr id="1" name=""/>
+        <p:cNvGrpSpPr/>
+        <p:nvPr/>
+      </p:nvGrpSpPr>
+      <p:grpSpPr>
+        <a:xfrm>
+          <a:off x="0" y="0"/>
+          <a:ext cx="0" cy="0"/>
+          <a:chOff x="0" y="0"/>
+          <a:chExt cx="0" cy="0"/>
+        </a:xfrm>
+      </p:grpSpPr>
+      <p:sp>
+        <p:nvSpPr>
+          <p:cNvPr id="2" name="Slide Image Placeholder 1"/>
+          <p:cNvSpPr>
+            <a:spLocks noGrp="1" noRot="1" noChangeAspect="1"/>
+          </p:cNvSpPr>
+          <p:nvPr>
+            <p:ph type="sldImg"/>
+          </p:nvPr>
+        </p:nvSpPr>
+        <p:spPr/>
+      </p:sp>
+      <p:sp>
+        <p:nvSpPr>
+          <p:cNvPr id="3" name="Notes Placeholder 2"/>
+          <p:cNvSpPr>
+            <a:spLocks noGrp="1"/>
+          </p:cNvSpPr>
+          <p:nvPr>
+            <p:ph type="body" idx="1"/>
+          </p:nvPr>
+        </p:nvSpPr>
+        <p:spPr/>
+        <p:txBody>
+          <a:bodyPr/>
+          <a:lstStyle/>
+          <a:p>
+            <a:r>
+              <a:rPr lang="en-US" dirty="0"/>
+              <a:t>Benin went up 53 ranks.</a:t>
+            </a:r>
+          </a:p>
+          <a:p>
+            <a:r>
+              <a:rPr lang="en-US" dirty="0"/>
+              <a:t>Venezuela went down 85 ranks.</a:t>
+            </a:r>
+          </a:p>
+        </p:txBody>
+      </p:sp>
+      <p:sp>
+        <p:nvSpPr>
+          <p:cNvPr id="4" name="Slide Number Placeholder 3"/>
+          <p:cNvSpPr>
+            <a:spLocks noGrp="1"/>
+          </p:cNvSpPr>
+          <p:nvPr>
+            <p:ph type="sldNum" sz="quarter" idx="5"/>
+          </p:nvPr>
+        </p:nvSpPr>
+        <p:spPr/>
+        <p:txBody>
+          <a:bodyPr/>
+          <a:lstStyle/>
+          <a:p>
+            <a:fld id="{640D81CD-90DB-4B57-BD28-08BF15DF7E5B}" type="slidenum">
+              <a:rPr lang="en-US" smtClean="0"/>
+              <a:t>13</a:t>
+            </a:fld>
+            <a:endParaRPr lang="en-US"/>
+          </a:p>
+        </p:txBody>
+      </p:sp>
+    </p:spTree>
+    <p:extLst>
+      <p:ext uri="{BB962C8B-B14F-4D97-AF65-F5344CB8AC3E}">
+        <p14:creationId xmlns:p14="http://schemas.microsoft.com/office/powerpoint/2010/main" val="567985961"/>
+      </p:ext>
+    </p:extLst>
+  </p:cSld>
+  <p:clrMapOvr>
+    <a:masterClrMapping/>
+  </p:clrMapOvr>
+</p:notes>
+</file>
+
 <file path=ppt/slideLayouts/slideLayout1.xml><?xml version="1.0" encoding="utf-8"?>
 <p:sldLayout xmlns:a="http://schemas.openxmlformats.org/drawingml/2006/main" xmlns:r="http://schemas.openxmlformats.org/officeDocument/2006/relationships" xmlns:p="http://schemas.openxmlformats.org/presentationml/2006/main" type="title" preserve="1">
   <p:cSld name="Title Slide">
@@ -709,7 +807,7 @@
           <a:p>
             <a:fld id="{CA3BC65B-A3D7-4D86-9754-D4EDAB8AB9AC}" type="datetimeFigureOut">
               <a:rPr lang="en-US" smtClean="0"/>
-              <a:t>5/1/2021</a:t>
+              <a:t>5/2/2021</a:t>
             </a:fld>
             <a:endParaRPr lang="en-US"/>
           </a:p>
@@ -907,7 +1005,7 @@
           <a:p>
             <a:fld id="{CA3BC65B-A3D7-4D86-9754-D4EDAB8AB9AC}" type="datetimeFigureOut">
               <a:rPr lang="en-US" smtClean="0"/>
-              <a:t>5/1/2021</a:t>
+              <a:t>5/2/2021</a:t>
             </a:fld>
             <a:endParaRPr lang="en-US"/>
           </a:p>
@@ -1115,7 +1213,7 @@
           <a:p>
             <a:fld id="{CA3BC65B-A3D7-4D86-9754-D4EDAB8AB9AC}" type="datetimeFigureOut">
               <a:rPr lang="en-US" smtClean="0"/>
-              <a:t>5/1/2021</a:t>
+              <a:t>5/2/2021</a:t>
             </a:fld>
             <a:endParaRPr lang="en-US"/>
           </a:p>
@@ -1313,7 +1411,7 @@
           <a:p>
             <a:fld id="{CA3BC65B-A3D7-4D86-9754-D4EDAB8AB9AC}" type="datetimeFigureOut">
               <a:rPr lang="en-US" smtClean="0"/>
-              <a:t>5/1/2021</a:t>
+              <a:t>5/2/2021</a:t>
             </a:fld>
             <a:endParaRPr lang="en-US"/>
           </a:p>
@@ -1588,7 +1686,7 @@
           <a:p>
             <a:fld id="{CA3BC65B-A3D7-4D86-9754-D4EDAB8AB9AC}" type="datetimeFigureOut">
               <a:rPr lang="en-US" smtClean="0"/>
-              <a:t>5/1/2021</a:t>
+              <a:t>5/2/2021</a:t>
             </a:fld>
             <a:endParaRPr lang="en-US"/>
           </a:p>
@@ -1853,7 +1951,7 @@
           <a:p>
             <a:fld id="{CA3BC65B-A3D7-4D86-9754-D4EDAB8AB9AC}" type="datetimeFigureOut">
               <a:rPr lang="en-US" smtClean="0"/>
-              <a:t>5/1/2021</a:t>
+              <a:t>5/2/2021</a:t>
             </a:fld>
             <a:endParaRPr lang="en-US"/>
           </a:p>
@@ -2265,7 +2363,7 @@
           <a:p>
             <a:fld id="{CA3BC65B-A3D7-4D86-9754-D4EDAB8AB9AC}" type="datetimeFigureOut">
               <a:rPr lang="en-US" smtClean="0"/>
-              <a:t>5/1/2021</a:t>
+              <a:t>5/2/2021</a:t>
             </a:fld>
             <a:endParaRPr lang="en-US"/>
           </a:p>
@@ -2406,7 +2504,7 @@
           <a:p>
             <a:fld id="{CA3BC65B-A3D7-4D86-9754-D4EDAB8AB9AC}" type="datetimeFigureOut">
               <a:rPr lang="en-US" smtClean="0"/>
-              <a:t>5/1/2021</a:t>
+              <a:t>5/2/2021</a:t>
             </a:fld>
             <a:endParaRPr lang="en-US"/>
           </a:p>
@@ -2519,7 +2617,7 @@
           <a:p>
             <a:fld id="{CA3BC65B-A3D7-4D86-9754-D4EDAB8AB9AC}" type="datetimeFigureOut">
               <a:rPr lang="en-US" smtClean="0"/>
-              <a:t>5/1/2021</a:t>
+              <a:t>5/2/2021</a:t>
             </a:fld>
             <a:endParaRPr lang="en-US"/>
           </a:p>
@@ -2830,7 +2928,7 @@
           <a:p>
             <a:fld id="{CA3BC65B-A3D7-4D86-9754-D4EDAB8AB9AC}" type="datetimeFigureOut">
               <a:rPr lang="en-US" smtClean="0"/>
-              <a:t>5/1/2021</a:t>
+              <a:t>5/2/2021</a:t>
             </a:fld>
             <a:endParaRPr lang="en-US"/>
           </a:p>
@@ -3118,7 +3216,7 @@
           <a:p>
             <a:fld id="{CA3BC65B-A3D7-4D86-9754-D4EDAB8AB9AC}" type="datetimeFigureOut">
               <a:rPr lang="en-US" smtClean="0"/>
-              <a:t>5/1/2021</a:t>
+              <a:t>5/2/2021</a:t>
             </a:fld>
             <a:endParaRPr lang="en-US"/>
           </a:p>
@@ -3359,7 +3457,7 @@
           <a:p>
             <a:fld id="{CA3BC65B-A3D7-4D86-9754-D4EDAB8AB9AC}" type="datetimeFigureOut">
               <a:rPr lang="en-US" smtClean="0"/>
-              <a:t>5/1/2021</a:t>
+              <a:t>5/2/2021</a:t>
             </a:fld>
             <a:endParaRPr lang="en-US"/>
           </a:p>
@@ -4016,18 +4114,6 @@
             </a:r>
           </a:p>
           <a:p>
-            <a:r>
-              <a:rPr lang="en-US" dirty="0"/>
-              <a:t>Largest rise: ?</a:t>
-            </a:r>
-          </a:p>
-          <a:p>
-            <a:r>
-              <a:rPr lang="en-US" dirty="0"/>
-              <a:t>Largest fall: ?</a:t>
-            </a:r>
-          </a:p>
-          <a:p>
             <a:endParaRPr lang="en-US" dirty="0"/>
           </a:p>
         </p:txBody>
@@ -4186,25 +4272,13 @@
           <a:p>
             <a:r>
               <a:rPr lang="en-US" dirty="0"/>
-              <a:t>Highest Average Rank: Madagascar</a:t>
+              <a:t>Highest Average Rank: Liberia</a:t>
             </a:r>
           </a:p>
           <a:p>
             <a:r>
               <a:rPr lang="en-US" dirty="0"/>
-              <a:t>Lowest Average Rank: Burundi?</a:t>
-            </a:r>
-          </a:p>
-          <a:p>
-            <a:r>
-              <a:rPr lang="en-US" dirty="0"/>
-              <a:t>Largest Rise: ?</a:t>
-            </a:r>
-          </a:p>
-          <a:p>
-            <a:r>
-              <a:rPr lang="en-US" dirty="0"/>
-              <a:t>Largest Fall: ?</a:t>
+              <a:t>Lowest Average Rank: Burundi</a:t>
             </a:r>
           </a:p>
         </p:txBody>
@@ -4263,7 +4337,7 @@
             <a:pPr algn="ctr"/>
             <a:r>
               <a:rPr lang="en-US" dirty="0"/>
-              <a:t>Largest Change In Rank Overall</a:t>
+              <a:t>Largest Changes In Rank 2015-2019</a:t>
             </a:r>
           </a:p>
         </p:txBody>
@@ -4291,19 +4365,19 @@
           <a:p>
             <a:r>
               <a:rPr lang="en-US" dirty="0"/>
-              <a:t>Benin improved the most</a:t>
+              <a:t>Benin improved the most (Rank 155 to Rank 102)</a:t>
             </a:r>
           </a:p>
           <a:p>
             <a:r>
               <a:rPr lang="en-US" dirty="0"/>
-              <a:t>Venezuela had the largest drop</a:t>
+              <a:t>Venezuela had the largest drop (Rank 23 to Rank 108)</a:t>
             </a:r>
           </a:p>
           <a:p>
             <a:r>
               <a:rPr lang="en-US" dirty="0"/>
-              <a:t>How?</a:t>
+              <a:t>How? Why?</a:t>
             </a:r>
           </a:p>
           <a:p>
@@ -4346,10 +4420,10 @@
       </p:grpSpPr>
       <p:pic>
         <p:nvPicPr>
-          <p:cNvPr id="3" name="Picture 2" descr="A picture containing text, writing implement&#10;&#10;Description automatically generated">
-            <a:extLst>
-              <a:ext uri="{FF2B5EF4-FFF2-40B4-BE49-F238E27FC236}">
-                <a16:creationId xmlns:a16="http://schemas.microsoft.com/office/drawing/2014/main" id="{FD323AB5-4B29-43AF-9FEC-5A04711B65C5}"/>
+          <p:cNvPr id="4" name="Picture 3" descr="Chart, bar chart&#10;&#10;Description automatically generated">
+            <a:extLst>
+              <a:ext uri="{FF2B5EF4-FFF2-40B4-BE49-F238E27FC236}">
+                <a16:creationId xmlns:a16="http://schemas.microsoft.com/office/drawing/2014/main" id="{12FB4A2A-456E-47F7-A639-61C3B327A0D2}"/>
               </a:ext>
             </a:extLst>
           </p:cNvPr>
@@ -4462,17 +4536,59 @@
           <a:p>
             <a:r>
               <a:rPr lang="en-US" dirty="0"/>
-              <a:t>?</a:t>
+              <a:t>Significant increase in Welfare</a:t>
             </a:r>
           </a:p>
           <a:p>
             <a:r>
               <a:rPr lang="en-US" dirty="0"/>
-              <a:t>?</a:t>
-            </a:r>
-          </a:p>
-        </p:txBody>
-      </p:sp>
+              <a:t>Significant increase in Health</a:t>
+            </a:r>
+          </a:p>
+          <a:p>
+            <a:r>
+              <a:rPr lang="en-US" dirty="0"/>
+              <a:t>Freedom was rising then fell</a:t>
+            </a:r>
+          </a:p>
+        </p:txBody>
+      </p:sp>
+      <p:pic>
+        <p:nvPicPr>
+          <p:cNvPr id="5" name="Picture 4" descr="Chart, bar chart&#10;&#10;Description automatically generated">
+            <a:extLst>
+              <a:ext uri="{FF2B5EF4-FFF2-40B4-BE49-F238E27FC236}">
+                <a16:creationId xmlns:a16="http://schemas.microsoft.com/office/drawing/2014/main" id="{576A8191-019A-4642-80A8-BF393513B0B4}"/>
+              </a:ext>
+            </a:extLst>
+          </p:cNvPr>
+          <p:cNvPicPr>
+            <a:picLocks noChangeAspect="1"/>
+          </p:cNvPicPr>
+          <p:nvPr/>
+        </p:nvPicPr>
+        <p:blipFill>
+          <a:blip r:embed="rId2">
+            <a:extLst>
+              <a:ext uri="{28A0092B-C50C-407E-A947-70E740481C1C}">
+                <a14:useLocalDpi xmlns:a14="http://schemas.microsoft.com/office/drawing/2010/main" val="0"/>
+              </a:ext>
+            </a:extLst>
+          </a:blip>
+          <a:stretch>
+            <a:fillRect/>
+          </a:stretch>
+        </p:blipFill>
+        <p:spPr>
+          <a:xfrm>
+            <a:off x="5777024" y="1582571"/>
+            <a:ext cx="6414976" cy="4811232"/>
+          </a:xfrm>
+          <a:prstGeom prst="rect">
+            <a:avLst/>
+          </a:prstGeom>
+        </p:spPr>
+      </p:pic>
     </p:spTree>
     <p:extLst>
       <p:ext uri="{BB962C8B-B14F-4D97-AF65-F5344CB8AC3E}">
@@ -4505,10 +4621,10 @@
       </p:grpSpPr>
       <p:pic>
         <p:nvPicPr>
-          <p:cNvPr id="3" name="Picture 2" descr="Chart, bar chart&#10;&#10;Description automatically generated">
-            <a:extLst>
-              <a:ext uri="{FF2B5EF4-FFF2-40B4-BE49-F238E27FC236}">
-                <a16:creationId xmlns:a16="http://schemas.microsoft.com/office/drawing/2014/main" id="{DA6E02CE-0251-4CF0-AE8F-2777DCC4C5FC}"/>
+          <p:cNvPr id="4" name="Picture 3" descr="Chart, bar chart&#10;&#10;Description automatically generated">
+            <a:extLst>
+              <a:ext uri="{FF2B5EF4-FFF2-40B4-BE49-F238E27FC236}">
+                <a16:creationId xmlns:a16="http://schemas.microsoft.com/office/drawing/2014/main" id="{A3F848C0-9183-44EA-9088-73205E4789C2}"/>
               </a:ext>
             </a:extLst>
           </p:cNvPr>
@@ -4632,6 +4748,42 @@
           </a:p>
         </p:txBody>
       </p:sp>
+      <p:pic>
+        <p:nvPicPr>
+          <p:cNvPr id="4" name="Picture 3" descr="Chart, bar chart&#10;&#10;Description automatically generated">
+            <a:extLst>
+              <a:ext uri="{FF2B5EF4-FFF2-40B4-BE49-F238E27FC236}">
+                <a16:creationId xmlns:a16="http://schemas.microsoft.com/office/drawing/2014/main" id="{53EA2AD4-5F3D-4604-BD09-601C145854ED}"/>
+              </a:ext>
+            </a:extLst>
+          </p:cNvPr>
+          <p:cNvPicPr>
+            <a:picLocks noChangeAspect="1"/>
+          </p:cNvPicPr>
+          <p:nvPr/>
+        </p:nvPicPr>
+        <p:blipFill>
+          <a:blip r:embed="rId2">
+            <a:extLst>
+              <a:ext uri="{28A0092B-C50C-407E-A947-70E740481C1C}">
+                <a14:useLocalDpi xmlns:a14="http://schemas.microsoft.com/office/drawing/2010/main" val="0"/>
+              </a:ext>
+            </a:extLst>
+          </a:blip>
+          <a:stretch>
+            <a:fillRect/>
+          </a:stretch>
+        </p:blipFill>
+        <p:spPr>
+          <a:xfrm>
+            <a:off x="6006213" y="1928037"/>
+            <a:ext cx="6185787" cy="4639340"/>
+          </a:xfrm>
+          <a:prstGeom prst="rect">
+            <a:avLst/>
+          </a:prstGeom>
+        </p:spPr>
+      </p:pic>
     </p:spTree>
     <p:extLst>
       <p:ext uri="{BB962C8B-B14F-4D97-AF65-F5344CB8AC3E}">

</xml_diff>

<commit_message>
Added the new top & bottom graphs to the powerpoint
</commit_message>
<xml_diff>
--- a/CSC 583 Project - Barrett & Bruggemann.pptx
+++ b/CSC 583 Project - Barrett & Bruggemann.pptx
@@ -5038,10 +5038,10 @@
       </p:grpSpPr>
       <p:pic>
         <p:nvPicPr>
-          <p:cNvPr id="3" name="Picture 2" descr="Chart, bar chart&#10;&#10;Description automatically generated">
-            <a:extLst>
-              <a:ext uri="{FF2B5EF4-FFF2-40B4-BE49-F238E27FC236}">
-                <a16:creationId xmlns:a16="http://schemas.microsoft.com/office/drawing/2014/main" id="{04A807AF-9C3F-4061-9B8D-BD9198F1505F}"/>
+          <p:cNvPr id="4" name="Picture 3" descr="Chart, bar chart&#10;&#10;Description automatically generated">
+            <a:extLst>
+              <a:ext uri="{FF2B5EF4-FFF2-40B4-BE49-F238E27FC236}">
+                <a16:creationId xmlns:a16="http://schemas.microsoft.com/office/drawing/2014/main" id="{85751D2A-FE58-41EB-856F-AE39DFF7FDA4}"/>
               </a:ext>
             </a:extLst>
           </p:cNvPr>
@@ -5104,10 +5104,10 @@
       </p:grpSpPr>
       <p:pic>
         <p:nvPicPr>
-          <p:cNvPr id="5" name="Picture 4" descr="Chart, bar chart, histogram&#10;&#10;Description automatically generated">
-            <a:extLst>
-              <a:ext uri="{FF2B5EF4-FFF2-40B4-BE49-F238E27FC236}">
-                <a16:creationId xmlns:a16="http://schemas.microsoft.com/office/drawing/2014/main" id="{016327DB-2619-4017-8DDB-FECCCB75F49D}"/>
+          <p:cNvPr id="3" name="Picture 2" descr="Chart, bar chart&#10;&#10;Description automatically generated">
+            <a:extLst>
+              <a:ext uri="{FF2B5EF4-FFF2-40B4-BE49-F238E27FC236}">
+                <a16:creationId xmlns:a16="http://schemas.microsoft.com/office/drawing/2014/main" id="{53D42409-703E-4676-83C9-90AB19F22FFA}"/>
               </a:ext>
             </a:extLst>
           </p:cNvPr>
@@ -5170,10 +5170,10 @@
       </p:grpSpPr>
       <p:pic>
         <p:nvPicPr>
-          <p:cNvPr id="5" name="Picture 4" descr="Chart, bar chart&#10;&#10;Description automatically generated with medium confidence">
-            <a:extLst>
-              <a:ext uri="{FF2B5EF4-FFF2-40B4-BE49-F238E27FC236}">
-                <a16:creationId xmlns:a16="http://schemas.microsoft.com/office/drawing/2014/main" id="{ECAF0975-8256-4AE6-A443-7140BFAA8889}"/>
+          <p:cNvPr id="3" name="Picture 2" descr="Chart, bar chart&#10;&#10;Description automatically generated">
+            <a:extLst>
+              <a:ext uri="{FF2B5EF4-FFF2-40B4-BE49-F238E27FC236}">
+                <a16:creationId xmlns:a16="http://schemas.microsoft.com/office/drawing/2014/main" id="{B06C88CE-3CD4-41FB-8360-8B5F28C69424}"/>
               </a:ext>
             </a:extLst>
           </p:cNvPr>
@@ -5236,10 +5236,10 @@
       </p:grpSpPr>
       <p:pic>
         <p:nvPicPr>
-          <p:cNvPr id="3" name="Picture 2" descr="Chart, bar chart&#10;&#10;Description automatically generated">
-            <a:extLst>
-              <a:ext uri="{FF2B5EF4-FFF2-40B4-BE49-F238E27FC236}">
-                <a16:creationId xmlns:a16="http://schemas.microsoft.com/office/drawing/2014/main" id="{9FF70FAE-9CBF-4FAC-BF7C-FFBA8B741885}"/>
+          <p:cNvPr id="4" name="Picture 3" descr="Chart, bar chart&#10;&#10;Description automatically generated">
+            <a:extLst>
+              <a:ext uri="{FF2B5EF4-FFF2-40B4-BE49-F238E27FC236}">
+                <a16:creationId xmlns:a16="http://schemas.microsoft.com/office/drawing/2014/main" id="{AA489E3B-CA33-4672-A889-C94C71B04153}"/>
               </a:ext>
             </a:extLst>
           </p:cNvPr>

</xml_diff>

<commit_message>
Improved benin and ven. graphs; updated PP
</commit_message>
<xml_diff>
--- a/CSC 583 Project - Barrett & Bruggemann.pptx
+++ b/CSC 583 Project - Barrett & Bruggemann.pptx
@@ -651,6 +651,90 @@
     <p:extLst>
       <p:ext uri="{BB962C8B-B14F-4D97-AF65-F5344CB8AC3E}">
         <p14:creationId xmlns:p14="http://schemas.microsoft.com/office/powerpoint/2010/main" val="567985961"/>
+      </p:ext>
+    </p:extLst>
+  </p:cSld>
+  <p:clrMapOvr>
+    <a:masterClrMapping/>
+  </p:clrMapOvr>
+</p:notes>
+</file>
+
+<file path=ppt/notesSlides/notesSlide3.xml><?xml version="1.0" encoding="utf-8"?>
+<p:notes xmlns:a="http://schemas.openxmlformats.org/drawingml/2006/main" xmlns:r="http://schemas.openxmlformats.org/officeDocument/2006/relationships" xmlns:p="http://schemas.openxmlformats.org/presentationml/2006/main">
+  <p:cSld>
+    <p:spTree>
+      <p:nvGrpSpPr>
+        <p:cNvPr id="1" name=""/>
+        <p:cNvGrpSpPr/>
+        <p:nvPr/>
+      </p:nvGrpSpPr>
+      <p:grpSpPr>
+        <a:xfrm>
+          <a:off x="0" y="0"/>
+          <a:ext cx="0" cy="0"/>
+          <a:chOff x="0" y="0"/>
+          <a:chExt cx="0" cy="0"/>
+        </a:xfrm>
+      </p:grpSpPr>
+      <p:sp>
+        <p:nvSpPr>
+          <p:cNvPr id="2" name="Slide Image Placeholder 1"/>
+          <p:cNvSpPr>
+            <a:spLocks noGrp="1" noRot="1" noChangeAspect="1"/>
+          </p:cNvSpPr>
+          <p:nvPr>
+            <p:ph type="sldImg"/>
+          </p:nvPr>
+        </p:nvSpPr>
+        <p:spPr/>
+      </p:sp>
+      <p:sp>
+        <p:nvSpPr>
+          <p:cNvPr id="3" name="Notes Placeholder 2"/>
+          <p:cNvSpPr>
+            <a:spLocks noGrp="1"/>
+          </p:cNvSpPr>
+          <p:nvPr>
+            <p:ph type="body" idx="1"/>
+          </p:nvPr>
+        </p:nvSpPr>
+        <p:spPr/>
+        <p:txBody>
+          <a:bodyPr/>
+          <a:lstStyle/>
+          <a:p>
+            <a:endParaRPr lang="en-US" dirty="0"/>
+          </a:p>
+        </p:txBody>
+      </p:sp>
+      <p:sp>
+        <p:nvSpPr>
+          <p:cNvPr id="4" name="Slide Number Placeholder 3"/>
+          <p:cNvSpPr>
+            <a:spLocks noGrp="1"/>
+          </p:cNvSpPr>
+          <p:nvPr>
+            <p:ph type="sldNum" sz="quarter" idx="5"/>
+          </p:nvPr>
+        </p:nvSpPr>
+        <p:spPr/>
+        <p:txBody>
+          <a:bodyPr/>
+          <a:lstStyle/>
+          <a:p>
+            <a:fld id="{640D81CD-90DB-4B57-BD28-08BF15DF7E5B}" type="slidenum">
+              <a:rPr lang="en-US" smtClean="0"/>
+              <a:t>14</a:t>
+            </a:fld>
+            <a:endParaRPr lang="en-US"/>
+          </a:p>
+        </p:txBody>
+      </p:sp>
+    </p:spTree>
+    <p:extLst>
+      <p:ext uri="{BB962C8B-B14F-4D97-AF65-F5344CB8AC3E}">
+        <p14:creationId xmlns:p14="http://schemas.microsoft.com/office/powerpoint/2010/main" val="3954201431"/>
       </p:ext>
     </p:extLst>
   </p:cSld>
@@ -4420,10 +4504,10 @@
       </p:grpSpPr>
       <p:pic>
         <p:nvPicPr>
-          <p:cNvPr id="4" name="Picture 3" descr="Chart, bar chart&#10;&#10;Description automatically generated">
-            <a:extLst>
-              <a:ext uri="{FF2B5EF4-FFF2-40B4-BE49-F238E27FC236}">
-                <a16:creationId xmlns:a16="http://schemas.microsoft.com/office/drawing/2014/main" id="{12FB4A2A-456E-47F7-A639-61C3B327A0D2}"/>
+          <p:cNvPr id="8" name="Picture 7" descr="Chart, bar chart&#10;&#10;Description automatically generated">
+            <a:extLst>
+              <a:ext uri="{FF2B5EF4-FFF2-40B4-BE49-F238E27FC236}">
+                <a16:creationId xmlns:a16="http://schemas.microsoft.com/office/drawing/2014/main" id="{34124AF4-A944-4218-8554-00A6652BA9FE}"/>
               </a:ext>
             </a:extLst>
           </p:cNvPr>
@@ -4433,7 +4517,7 @@
           <p:nvPr/>
         </p:nvPicPr>
         <p:blipFill>
-          <a:blip r:embed="rId2">
+          <a:blip r:embed="rId3">
             <a:extLst>
               <a:ext uri="{28A0092B-C50C-407E-A947-70E740481C1C}">
                 <a14:useLocalDpi xmlns:a14="http://schemas.microsoft.com/office/drawing/2010/main" val="0"/>
@@ -4446,8 +4530,8 @@
         </p:blipFill>
         <p:spPr>
           <a:xfrm>
-            <a:off x="1524000" y="0"/>
-            <a:ext cx="9144000" cy="6858000"/>
+            <a:off x="0" y="187523"/>
+            <a:ext cx="12192000" cy="6482953"/>
           </a:xfrm>
           <a:prstGeom prst="rect">
             <a:avLst/>
@@ -4555,10 +4639,10 @@
       </p:sp>
       <p:pic>
         <p:nvPicPr>
-          <p:cNvPr id="5" name="Picture 4" descr="Chart, bar chart&#10;&#10;Description automatically generated">
-            <a:extLst>
-              <a:ext uri="{FF2B5EF4-FFF2-40B4-BE49-F238E27FC236}">
-                <a16:creationId xmlns:a16="http://schemas.microsoft.com/office/drawing/2014/main" id="{576A8191-019A-4642-80A8-BF393513B0B4}"/>
+          <p:cNvPr id="6" name="Picture 5" descr="Chart, bar chart&#10;&#10;Description automatically generated">
+            <a:extLst>
+              <a:ext uri="{FF2B5EF4-FFF2-40B4-BE49-F238E27FC236}">
+                <a16:creationId xmlns:a16="http://schemas.microsoft.com/office/drawing/2014/main" id="{8B917A6D-86AE-4194-BEB6-66B507B2CC98}"/>
               </a:ext>
             </a:extLst>
           </p:cNvPr>
@@ -4581,8 +4665,8 @@
         </p:blipFill>
         <p:spPr>
           <a:xfrm>
-            <a:off x="5777024" y="1582571"/>
-            <a:ext cx="6414976" cy="4811232"/>
+            <a:off x="5713229" y="1690688"/>
+            <a:ext cx="6478771" cy="3445010"/>
           </a:xfrm>
           <a:prstGeom prst="rect">
             <a:avLst/>
@@ -4621,10 +4705,10 @@
       </p:grpSpPr>
       <p:pic>
         <p:nvPicPr>
-          <p:cNvPr id="4" name="Picture 3" descr="Chart, bar chart&#10;&#10;Description automatically generated">
-            <a:extLst>
-              <a:ext uri="{FF2B5EF4-FFF2-40B4-BE49-F238E27FC236}">
-                <a16:creationId xmlns:a16="http://schemas.microsoft.com/office/drawing/2014/main" id="{A3F848C0-9183-44EA-9088-73205E4789C2}"/>
+          <p:cNvPr id="6" name="Picture 5" descr="Chart, bar chart&#10;&#10;Description automatically generated">
+            <a:extLst>
+              <a:ext uri="{FF2B5EF4-FFF2-40B4-BE49-F238E27FC236}">
+                <a16:creationId xmlns:a16="http://schemas.microsoft.com/office/drawing/2014/main" id="{5CFF7DC7-D548-4977-B0FA-C559BB76C2D2}"/>
               </a:ext>
             </a:extLst>
           </p:cNvPr>
@@ -4647,8 +4731,8 @@
         </p:blipFill>
         <p:spPr>
           <a:xfrm>
-            <a:off x="1524000" y="0"/>
-            <a:ext cx="9144000" cy="6858000"/>
+            <a:off x="0" y="187523"/>
+            <a:ext cx="12192000" cy="6482953"/>
           </a:xfrm>
           <a:prstGeom prst="rect">
             <a:avLst/>
@@ -4750,10 +4834,10 @@
       </p:sp>
       <p:pic>
         <p:nvPicPr>
-          <p:cNvPr id="4" name="Picture 3" descr="Chart, bar chart&#10;&#10;Description automatically generated">
-            <a:extLst>
-              <a:ext uri="{FF2B5EF4-FFF2-40B4-BE49-F238E27FC236}">
-                <a16:creationId xmlns:a16="http://schemas.microsoft.com/office/drawing/2014/main" id="{53EA2AD4-5F3D-4604-BD09-601C145854ED}"/>
+          <p:cNvPr id="5" name="Picture 4">
+            <a:extLst>
+              <a:ext uri="{FF2B5EF4-FFF2-40B4-BE49-F238E27FC236}">
+                <a16:creationId xmlns:a16="http://schemas.microsoft.com/office/drawing/2014/main" id="{F285F9EC-8225-4A08-896D-43678940F2FC}"/>
               </a:ext>
             </a:extLst>
           </p:cNvPr>
@@ -4776,8 +4860,8 @@
         </p:blipFill>
         <p:spPr>
           <a:xfrm>
-            <a:off x="6006213" y="1928037"/>
-            <a:ext cx="6185787" cy="4639340"/>
+            <a:off x="5465135" y="1881432"/>
+            <a:ext cx="6726865" cy="3576932"/>
           </a:xfrm>
           <a:prstGeom prst="rect">
             <a:avLst/>

</xml_diff>

<commit_message>
Updated rank change graphs to be more readable
</commit_message>
<xml_diff>
--- a/CSC 583 Project - Barrett & Bruggemann.pptx
+++ b/CSC 583 Project - Barrett & Bruggemann.pptx
@@ -5,7 +5,7 @@
     <p:sldMasterId id="2147483648" r:id="rId1"/>
   </p:sldMasterIdLst>
   <p:notesMasterIdLst>
-    <p:notesMasterId r:id="rId19"/>
+    <p:notesMasterId r:id="rId27"/>
   </p:notesMasterIdLst>
   <p:sldIdLst>
     <p:sldId id="256" r:id="rId2"/>
@@ -25,6 +25,14 @@
     <p:sldId id="270" r:id="rId16"/>
     <p:sldId id="271" r:id="rId17"/>
     <p:sldId id="272" r:id="rId18"/>
+    <p:sldId id="273" r:id="rId19"/>
+    <p:sldId id="274" r:id="rId20"/>
+    <p:sldId id="275" r:id="rId21"/>
+    <p:sldId id="276" r:id="rId22"/>
+    <p:sldId id="277" r:id="rId23"/>
+    <p:sldId id="278" r:id="rId24"/>
+    <p:sldId id="279" r:id="rId25"/>
+    <p:sldId id="280" r:id="rId26"/>
   </p:sldIdLst>
   <p:sldSz cx="12192000" cy="6858000"/>
   <p:notesSz cx="6858000" cy="9144000"/>
@@ -524,10 +532,7 @@
           <a:bodyPr/>
           <a:lstStyle/>
           <a:p>
-            <a:r>
-              <a:rPr lang="en-US" dirty="0"/>
-              <a:t>*Note, many of the bottom happiest are more unstable. Therefore, for certain ones there are missing years of data that are affecting the overall score</a:t>
-            </a:r>
+            <a:endParaRPr lang="en-US" dirty="0"/>
           </a:p>
         </p:txBody>
       </p:sp>
@@ -548,7 +553,7 @@
           <a:p>
             <a:fld id="{640D81CD-90DB-4B57-BD28-08BF15DF7E5B}" type="slidenum">
               <a:rPr lang="en-US" smtClean="0"/>
-              <a:t>11</a:t>
+              <a:t>9</a:t>
             </a:fld>
             <a:endParaRPr lang="en-US"/>
           </a:p>
@@ -557,7 +562,7 @@
     </p:spTree>
     <p:extLst>
       <p:ext uri="{BB962C8B-B14F-4D97-AF65-F5344CB8AC3E}">
-        <p14:creationId xmlns:p14="http://schemas.microsoft.com/office/powerpoint/2010/main" val="1631752050"/>
+        <p14:creationId xmlns:p14="http://schemas.microsoft.com/office/powerpoint/2010/main" val="3993204464"/>
       </p:ext>
     </p:extLst>
   </p:cSld>
@@ -613,6 +618,93 @@
           <a:p>
             <a:r>
               <a:rPr lang="en-US" dirty="0"/>
+              <a:t>*Note, many of the bottom happiest are more unstable. Therefore, for certain ones there are missing years of data that are affecting the overall score</a:t>
+            </a:r>
+          </a:p>
+        </p:txBody>
+      </p:sp>
+      <p:sp>
+        <p:nvSpPr>
+          <p:cNvPr id="4" name="Slide Number Placeholder 3"/>
+          <p:cNvSpPr>
+            <a:spLocks noGrp="1"/>
+          </p:cNvSpPr>
+          <p:nvPr>
+            <p:ph type="sldNum" sz="quarter" idx="5"/>
+          </p:nvPr>
+        </p:nvSpPr>
+        <p:spPr/>
+        <p:txBody>
+          <a:bodyPr/>
+          <a:lstStyle/>
+          <a:p>
+            <a:fld id="{640D81CD-90DB-4B57-BD28-08BF15DF7E5B}" type="slidenum">
+              <a:rPr lang="en-US" smtClean="0"/>
+              <a:t>11</a:t>
+            </a:fld>
+            <a:endParaRPr lang="en-US"/>
+          </a:p>
+        </p:txBody>
+      </p:sp>
+    </p:spTree>
+    <p:extLst>
+      <p:ext uri="{BB962C8B-B14F-4D97-AF65-F5344CB8AC3E}">
+        <p14:creationId xmlns:p14="http://schemas.microsoft.com/office/powerpoint/2010/main" val="1631752050"/>
+      </p:ext>
+    </p:extLst>
+  </p:cSld>
+  <p:clrMapOvr>
+    <a:masterClrMapping/>
+  </p:clrMapOvr>
+</p:notes>
+</file>
+
+<file path=ppt/notesSlides/notesSlide3.xml><?xml version="1.0" encoding="utf-8"?>
+<p:notes xmlns:a="http://schemas.openxmlformats.org/drawingml/2006/main" xmlns:r="http://schemas.openxmlformats.org/officeDocument/2006/relationships" xmlns:p="http://schemas.openxmlformats.org/presentationml/2006/main">
+  <p:cSld>
+    <p:spTree>
+      <p:nvGrpSpPr>
+        <p:cNvPr id="1" name=""/>
+        <p:cNvGrpSpPr/>
+        <p:nvPr/>
+      </p:nvGrpSpPr>
+      <p:grpSpPr>
+        <a:xfrm>
+          <a:off x="0" y="0"/>
+          <a:ext cx="0" cy="0"/>
+          <a:chOff x="0" y="0"/>
+          <a:chExt cx="0" cy="0"/>
+        </a:xfrm>
+      </p:grpSpPr>
+      <p:sp>
+        <p:nvSpPr>
+          <p:cNvPr id="2" name="Slide Image Placeholder 1"/>
+          <p:cNvSpPr>
+            <a:spLocks noGrp="1" noRot="1" noChangeAspect="1"/>
+          </p:cNvSpPr>
+          <p:nvPr>
+            <p:ph type="sldImg"/>
+          </p:nvPr>
+        </p:nvSpPr>
+        <p:spPr/>
+      </p:sp>
+      <p:sp>
+        <p:nvSpPr>
+          <p:cNvPr id="3" name="Notes Placeholder 2"/>
+          <p:cNvSpPr>
+            <a:spLocks noGrp="1"/>
+          </p:cNvSpPr>
+          <p:nvPr>
+            <p:ph type="body" idx="1"/>
+          </p:nvPr>
+        </p:nvSpPr>
+        <p:spPr/>
+        <p:txBody>
+          <a:bodyPr/>
+          <a:lstStyle/>
+          <a:p>
+            <a:r>
+              <a:rPr lang="en-US" dirty="0"/>
               <a:t>Benin went up 53 ranks.</a:t>
             </a:r>
           </a:p>
@@ -660,7 +752,7 @@
 </p:notes>
 </file>
 
-<file path=ppt/notesSlides/notesSlide3.xml><?xml version="1.0" encoding="utf-8"?>
+<file path=ppt/notesSlides/notesSlide4.xml><?xml version="1.0" encoding="utf-8"?>
 <p:notes xmlns:a="http://schemas.openxmlformats.org/drawingml/2006/main" xmlns:r="http://schemas.openxmlformats.org/officeDocument/2006/relationships" xmlns:p="http://schemas.openxmlformats.org/presentationml/2006/main">
   <p:cSld>
     <p:spTree>
@@ -4202,6 +4294,42 @@
           </a:p>
         </p:txBody>
       </p:sp>
+      <p:pic>
+        <p:nvPicPr>
+          <p:cNvPr id="4" name="Picture 3" descr="Chart, bar chart&#10;&#10;Description automatically generated">
+            <a:extLst>
+              <a:ext uri="{FF2B5EF4-FFF2-40B4-BE49-F238E27FC236}">
+                <a16:creationId xmlns:a16="http://schemas.microsoft.com/office/drawing/2014/main" id="{B1ED56DA-FC1C-4FF5-A6F6-20EA61E5B321}"/>
+              </a:ext>
+            </a:extLst>
+          </p:cNvPr>
+          <p:cNvPicPr>
+            <a:picLocks noChangeAspect="1"/>
+          </p:cNvPicPr>
+          <p:nvPr/>
+        </p:nvPicPr>
+        <p:blipFill>
+          <a:blip r:embed="rId2">
+            <a:extLst>
+              <a:ext uri="{28A0092B-C50C-407E-A947-70E740481C1C}">
+                <a14:useLocalDpi xmlns:a14="http://schemas.microsoft.com/office/drawing/2010/main" val="0"/>
+              </a:ext>
+            </a:extLst>
+          </a:blip>
+          <a:stretch>
+            <a:fillRect/>
+          </a:stretch>
+        </p:blipFill>
+        <p:spPr>
+          <a:xfrm>
+            <a:off x="5847906" y="1527627"/>
+            <a:ext cx="6259031" cy="3328166"/>
+          </a:xfrm>
+          <a:prstGeom prst="rect">
+            <a:avLst/>
+          </a:prstGeom>
+        </p:spPr>
+      </p:pic>
     </p:spTree>
     <p:extLst>
       <p:ext uri="{BB962C8B-B14F-4D97-AF65-F5344CB8AC3E}">
@@ -4234,10 +4362,10 @@
       </p:grpSpPr>
       <p:pic>
         <p:nvPicPr>
-          <p:cNvPr id="3" name="Picture 2" descr="Chart, bar chart&#10;&#10;Description automatically generated">
-            <a:extLst>
-              <a:ext uri="{FF2B5EF4-FFF2-40B4-BE49-F238E27FC236}">
-                <a16:creationId xmlns:a16="http://schemas.microsoft.com/office/drawing/2014/main" id="{C34EC16E-1C82-49D1-A109-F03ED02A9E8C}"/>
+          <p:cNvPr id="4" name="Picture 3" descr="Chart, bar chart&#10;&#10;Description automatically generated">
+            <a:extLst>
+              <a:ext uri="{FF2B5EF4-FFF2-40B4-BE49-F238E27FC236}">
+                <a16:creationId xmlns:a16="http://schemas.microsoft.com/office/drawing/2014/main" id="{0334E480-059A-4798-A871-A9EB2D6B345B}"/>
               </a:ext>
             </a:extLst>
           </p:cNvPr>
@@ -4367,6 +4495,42 @@
           </a:p>
         </p:txBody>
       </p:sp>
+      <p:pic>
+        <p:nvPicPr>
+          <p:cNvPr id="4" name="Picture 3" descr="Chart, bar chart&#10;&#10;Description automatically generated">
+            <a:extLst>
+              <a:ext uri="{FF2B5EF4-FFF2-40B4-BE49-F238E27FC236}">
+                <a16:creationId xmlns:a16="http://schemas.microsoft.com/office/drawing/2014/main" id="{DD066033-E457-4535-A4B4-C1554EEB3FC3}"/>
+              </a:ext>
+            </a:extLst>
+          </p:cNvPr>
+          <p:cNvPicPr>
+            <a:picLocks noChangeAspect="1"/>
+          </p:cNvPicPr>
+          <p:nvPr/>
+        </p:nvPicPr>
+        <p:blipFill>
+          <a:blip r:embed="rId2">
+            <a:extLst>
+              <a:ext uri="{28A0092B-C50C-407E-A947-70E740481C1C}">
+                <a14:useLocalDpi xmlns:a14="http://schemas.microsoft.com/office/drawing/2010/main" val="0"/>
+              </a:ext>
+            </a:extLst>
+          </a:blip>
+          <a:stretch>
+            <a:fillRect/>
+          </a:stretch>
+        </p:blipFill>
+        <p:spPr>
+          <a:xfrm>
+            <a:off x="5589986" y="1304261"/>
+            <a:ext cx="6545306" cy="3480390"/>
+          </a:xfrm>
+          <a:prstGeom prst="rect">
+            <a:avLst/>
+          </a:prstGeom>
+        </p:spPr>
+      </p:pic>
     </p:spTree>
     <p:extLst>
       <p:ext uri="{BB962C8B-B14F-4D97-AF65-F5344CB8AC3E}">
@@ -4821,14 +4985,20 @@
           <a:p>
             <a:r>
               <a:rPr lang="en-US" dirty="0"/>
-              <a:t>?</a:t>
+              <a:t>Corruption significantly down</a:t>
             </a:r>
           </a:p>
           <a:p>
             <a:r>
               <a:rPr lang="en-US" dirty="0"/>
-              <a:t>?</a:t>
-            </a:r>
+              <a:t>GDP down</a:t>
+            </a:r>
+          </a:p>
+          <a:p>
+            <a:pPr marL="0" indent="0">
+              <a:buNone/>
+            </a:pPr>
+            <a:endParaRPr lang="en-US" dirty="0"/>
           </a:p>
         </p:txBody>
       </p:sp>
@@ -4881,6 +5051,171 @@
 </p:sld>
 </file>
 
+<file path=ppt/slides/slide18.xml><?xml version="1.0" encoding="utf-8"?>
+<p:sld xmlns:a="http://schemas.openxmlformats.org/drawingml/2006/main" xmlns:r="http://schemas.openxmlformats.org/officeDocument/2006/relationships" xmlns:p="http://schemas.openxmlformats.org/presentationml/2006/main">
+  <p:cSld>
+    <p:spTree>
+      <p:nvGrpSpPr>
+        <p:cNvPr id="1" name=""/>
+        <p:cNvGrpSpPr/>
+        <p:nvPr/>
+      </p:nvGrpSpPr>
+      <p:grpSpPr>
+        <a:xfrm>
+          <a:off x="0" y="0"/>
+          <a:ext cx="0" cy="0"/>
+          <a:chOff x="0" y="0"/>
+          <a:chExt cx="0" cy="0"/>
+        </a:xfrm>
+      </p:grpSpPr>
+      <p:sp>
+        <p:nvSpPr>
+          <p:cNvPr id="2" name="Title 1">
+            <a:extLst>
+              <a:ext uri="{FF2B5EF4-FFF2-40B4-BE49-F238E27FC236}">
+                <a16:creationId xmlns:a16="http://schemas.microsoft.com/office/drawing/2014/main" id="{0E3B28B1-6473-47CD-9939-7CB63187D749}"/>
+              </a:ext>
+            </a:extLst>
+          </p:cNvPr>
+          <p:cNvSpPr>
+            <a:spLocks noGrp="1"/>
+          </p:cNvSpPr>
+          <p:nvPr>
+            <p:ph type="title"/>
+          </p:nvPr>
+        </p:nvSpPr>
+        <p:spPr/>
+        <p:txBody>
+          <a:bodyPr/>
+          <a:lstStyle/>
+          <a:p>
+            <a:pPr algn="ctr"/>
+            <a:r>
+              <a:rPr lang="en-US" dirty="0"/>
+              <a:t>Finding The Factors</a:t>
+            </a:r>
+          </a:p>
+        </p:txBody>
+      </p:sp>
+      <p:sp>
+        <p:nvSpPr>
+          <p:cNvPr id="3" name="Content Placeholder 2">
+            <a:extLst>
+              <a:ext uri="{FF2B5EF4-FFF2-40B4-BE49-F238E27FC236}">
+                <a16:creationId xmlns:a16="http://schemas.microsoft.com/office/drawing/2014/main" id="{11D8BCC7-5C3B-4423-982C-128E13C34008}"/>
+              </a:ext>
+            </a:extLst>
+          </p:cNvPr>
+          <p:cNvSpPr>
+            <a:spLocks noGrp="1"/>
+          </p:cNvSpPr>
+          <p:nvPr>
+            <p:ph idx="1"/>
+          </p:nvPr>
+        </p:nvSpPr>
+        <p:spPr/>
+        <p:txBody>
+          <a:bodyPr/>
+          <a:lstStyle/>
+          <a:p>
+            <a:r>
+              <a:rPr lang="en-US" dirty="0"/>
+              <a:t>How?</a:t>
+            </a:r>
+          </a:p>
+          <a:p>
+            <a:r>
+              <a:rPr lang="en-US" dirty="0"/>
+              <a:t>Coincidence or contributor?</a:t>
+            </a:r>
+          </a:p>
+          <a:p>
+            <a:pPr marL="0" indent="0">
+              <a:buNone/>
+            </a:pPr>
+            <a:endParaRPr lang="en-US" dirty="0"/>
+          </a:p>
+        </p:txBody>
+      </p:sp>
+    </p:spTree>
+    <p:extLst>
+      <p:ext uri="{BB962C8B-B14F-4D97-AF65-F5344CB8AC3E}">
+        <p14:creationId xmlns:p14="http://schemas.microsoft.com/office/powerpoint/2010/main" val="95437755"/>
+      </p:ext>
+    </p:extLst>
+  </p:cSld>
+  <p:clrMapOvr>
+    <a:masterClrMapping/>
+  </p:clrMapOvr>
+</p:sld>
+</file>
+
+<file path=ppt/slides/slide19.xml><?xml version="1.0" encoding="utf-8"?>
+<p:sld xmlns:a="http://schemas.openxmlformats.org/drawingml/2006/main" xmlns:r="http://schemas.openxmlformats.org/officeDocument/2006/relationships" xmlns:p="http://schemas.openxmlformats.org/presentationml/2006/main">
+  <p:cSld>
+    <p:spTree>
+      <p:nvGrpSpPr>
+        <p:cNvPr id="1" name=""/>
+        <p:cNvGrpSpPr/>
+        <p:nvPr/>
+      </p:nvGrpSpPr>
+      <p:grpSpPr>
+        <a:xfrm>
+          <a:off x="0" y="0"/>
+          <a:ext cx="0" cy="0"/>
+          <a:chOff x="0" y="0"/>
+          <a:chExt cx="0" cy="0"/>
+        </a:xfrm>
+      </p:grpSpPr>
+      <p:pic>
+        <p:nvPicPr>
+          <p:cNvPr id="3" name="Picture 2" descr="Chart, scatter chart&#10;&#10;Description automatically generated">
+            <a:extLst>
+              <a:ext uri="{FF2B5EF4-FFF2-40B4-BE49-F238E27FC236}">
+                <a16:creationId xmlns:a16="http://schemas.microsoft.com/office/drawing/2014/main" id="{A468632E-52B3-4B79-9AC0-09172BFE0EED}"/>
+              </a:ext>
+            </a:extLst>
+          </p:cNvPr>
+          <p:cNvPicPr>
+            <a:picLocks noChangeAspect="1"/>
+          </p:cNvPicPr>
+          <p:nvPr/>
+        </p:nvPicPr>
+        <p:blipFill>
+          <a:blip r:embed="rId2">
+            <a:extLst>
+              <a:ext uri="{28A0092B-C50C-407E-A947-70E740481C1C}">
+                <a14:useLocalDpi xmlns:a14="http://schemas.microsoft.com/office/drawing/2010/main" val="0"/>
+              </a:ext>
+            </a:extLst>
+          </a:blip>
+          <a:stretch>
+            <a:fillRect/>
+          </a:stretch>
+        </p:blipFill>
+        <p:spPr>
+          <a:xfrm>
+            <a:off x="1524000" y="0"/>
+            <a:ext cx="9144000" cy="6858000"/>
+          </a:xfrm>
+          <a:prstGeom prst="rect">
+            <a:avLst/>
+          </a:prstGeom>
+        </p:spPr>
+      </p:pic>
+    </p:spTree>
+    <p:extLst>
+      <p:ext uri="{BB962C8B-B14F-4D97-AF65-F5344CB8AC3E}">
+        <p14:creationId xmlns:p14="http://schemas.microsoft.com/office/powerpoint/2010/main" val="1095071454"/>
+      </p:ext>
+    </p:extLst>
+  </p:cSld>
+  <p:clrMapOvr>
+    <a:masterClrMapping/>
+  </p:clrMapOvr>
+</p:sld>
+</file>
+
 <file path=ppt/slides/slide2.xml><?xml version="1.0" encoding="utf-8"?>
 <p:sld xmlns:a="http://schemas.openxmlformats.org/drawingml/2006/main" xmlns:r="http://schemas.openxmlformats.org/officeDocument/2006/relationships" xmlns:p="http://schemas.openxmlformats.org/presentationml/2006/main">
   <p:cSld>
@@ -4971,6 +5306,453 @@
     <p:extLst>
       <p:ext uri="{BB962C8B-B14F-4D97-AF65-F5344CB8AC3E}">
         <p14:creationId xmlns:p14="http://schemas.microsoft.com/office/powerpoint/2010/main" val="167985233"/>
+      </p:ext>
+    </p:extLst>
+  </p:cSld>
+  <p:clrMapOvr>
+    <a:masterClrMapping/>
+  </p:clrMapOvr>
+</p:sld>
+</file>
+
+<file path=ppt/slides/slide20.xml><?xml version="1.0" encoding="utf-8"?>
+<p:sld xmlns:a="http://schemas.openxmlformats.org/drawingml/2006/main" xmlns:r="http://schemas.openxmlformats.org/officeDocument/2006/relationships" xmlns:p="http://schemas.openxmlformats.org/presentationml/2006/main">
+  <p:cSld>
+    <p:spTree>
+      <p:nvGrpSpPr>
+        <p:cNvPr id="1" name=""/>
+        <p:cNvGrpSpPr/>
+        <p:nvPr/>
+      </p:nvGrpSpPr>
+      <p:grpSpPr>
+        <a:xfrm>
+          <a:off x="0" y="0"/>
+          <a:ext cx="0" cy="0"/>
+          <a:chOff x="0" y="0"/>
+          <a:chExt cx="0" cy="0"/>
+        </a:xfrm>
+      </p:grpSpPr>
+      <p:pic>
+        <p:nvPicPr>
+          <p:cNvPr id="3" name="Picture 2" descr="Chart, scatter chart&#10;&#10;Description automatically generated">
+            <a:extLst>
+              <a:ext uri="{FF2B5EF4-FFF2-40B4-BE49-F238E27FC236}">
+                <a16:creationId xmlns:a16="http://schemas.microsoft.com/office/drawing/2014/main" id="{5A3C44D1-5A20-49D8-A533-A2ECFDC41072}"/>
+              </a:ext>
+            </a:extLst>
+          </p:cNvPr>
+          <p:cNvPicPr>
+            <a:picLocks noChangeAspect="1"/>
+          </p:cNvPicPr>
+          <p:nvPr/>
+        </p:nvPicPr>
+        <p:blipFill>
+          <a:blip r:embed="rId2">
+            <a:extLst>
+              <a:ext uri="{28A0092B-C50C-407E-A947-70E740481C1C}">
+                <a14:useLocalDpi xmlns:a14="http://schemas.microsoft.com/office/drawing/2010/main" val="0"/>
+              </a:ext>
+            </a:extLst>
+          </a:blip>
+          <a:stretch>
+            <a:fillRect/>
+          </a:stretch>
+        </p:blipFill>
+        <p:spPr>
+          <a:xfrm>
+            <a:off x="1524000" y="0"/>
+            <a:ext cx="9144000" cy="6858000"/>
+          </a:xfrm>
+          <a:prstGeom prst="rect">
+            <a:avLst/>
+          </a:prstGeom>
+        </p:spPr>
+      </p:pic>
+    </p:spTree>
+    <p:extLst>
+      <p:ext uri="{BB962C8B-B14F-4D97-AF65-F5344CB8AC3E}">
+        <p14:creationId xmlns:p14="http://schemas.microsoft.com/office/powerpoint/2010/main" val="2125064735"/>
+      </p:ext>
+    </p:extLst>
+  </p:cSld>
+  <p:clrMapOvr>
+    <a:masterClrMapping/>
+  </p:clrMapOvr>
+</p:sld>
+</file>
+
+<file path=ppt/slides/slide21.xml><?xml version="1.0" encoding="utf-8"?>
+<p:sld xmlns:a="http://schemas.openxmlformats.org/drawingml/2006/main" xmlns:r="http://schemas.openxmlformats.org/officeDocument/2006/relationships" xmlns:p="http://schemas.openxmlformats.org/presentationml/2006/main">
+  <p:cSld>
+    <p:spTree>
+      <p:nvGrpSpPr>
+        <p:cNvPr id="1" name=""/>
+        <p:cNvGrpSpPr/>
+        <p:nvPr/>
+      </p:nvGrpSpPr>
+      <p:grpSpPr>
+        <a:xfrm>
+          <a:off x="0" y="0"/>
+          <a:ext cx="0" cy="0"/>
+          <a:chOff x="0" y="0"/>
+          <a:chExt cx="0" cy="0"/>
+        </a:xfrm>
+      </p:grpSpPr>
+      <p:pic>
+        <p:nvPicPr>
+          <p:cNvPr id="3" name="Picture 2" descr="Chart, scatter chart&#10;&#10;Description automatically generated">
+            <a:extLst>
+              <a:ext uri="{FF2B5EF4-FFF2-40B4-BE49-F238E27FC236}">
+                <a16:creationId xmlns:a16="http://schemas.microsoft.com/office/drawing/2014/main" id="{E0457EE9-DC12-43F1-850D-BB7DE44AA58B}"/>
+              </a:ext>
+            </a:extLst>
+          </p:cNvPr>
+          <p:cNvPicPr>
+            <a:picLocks noChangeAspect="1"/>
+          </p:cNvPicPr>
+          <p:nvPr/>
+        </p:nvPicPr>
+        <p:blipFill>
+          <a:blip r:embed="rId2">
+            <a:extLst>
+              <a:ext uri="{28A0092B-C50C-407E-A947-70E740481C1C}">
+                <a14:useLocalDpi xmlns:a14="http://schemas.microsoft.com/office/drawing/2010/main" val="0"/>
+              </a:ext>
+            </a:extLst>
+          </a:blip>
+          <a:stretch>
+            <a:fillRect/>
+          </a:stretch>
+        </p:blipFill>
+        <p:spPr>
+          <a:xfrm>
+            <a:off x="1524000" y="0"/>
+            <a:ext cx="9144000" cy="6858000"/>
+          </a:xfrm>
+          <a:prstGeom prst="rect">
+            <a:avLst/>
+          </a:prstGeom>
+        </p:spPr>
+      </p:pic>
+    </p:spTree>
+    <p:extLst>
+      <p:ext uri="{BB962C8B-B14F-4D97-AF65-F5344CB8AC3E}">
+        <p14:creationId xmlns:p14="http://schemas.microsoft.com/office/powerpoint/2010/main" val="1076932393"/>
+      </p:ext>
+    </p:extLst>
+  </p:cSld>
+  <p:clrMapOvr>
+    <a:masterClrMapping/>
+  </p:clrMapOvr>
+</p:sld>
+</file>
+
+<file path=ppt/slides/slide22.xml><?xml version="1.0" encoding="utf-8"?>
+<p:sld xmlns:a="http://schemas.openxmlformats.org/drawingml/2006/main" xmlns:r="http://schemas.openxmlformats.org/officeDocument/2006/relationships" xmlns:p="http://schemas.openxmlformats.org/presentationml/2006/main">
+  <p:cSld>
+    <p:spTree>
+      <p:nvGrpSpPr>
+        <p:cNvPr id="1" name=""/>
+        <p:cNvGrpSpPr/>
+        <p:nvPr/>
+      </p:nvGrpSpPr>
+      <p:grpSpPr>
+        <a:xfrm>
+          <a:off x="0" y="0"/>
+          <a:ext cx="0" cy="0"/>
+          <a:chOff x="0" y="0"/>
+          <a:chExt cx="0" cy="0"/>
+        </a:xfrm>
+      </p:grpSpPr>
+      <p:pic>
+        <p:nvPicPr>
+          <p:cNvPr id="3" name="Picture 2" descr="Chart, scatter chart&#10;&#10;Description automatically generated">
+            <a:extLst>
+              <a:ext uri="{FF2B5EF4-FFF2-40B4-BE49-F238E27FC236}">
+                <a16:creationId xmlns:a16="http://schemas.microsoft.com/office/drawing/2014/main" id="{F9541778-E743-464C-8724-B7810C9BCAF6}"/>
+              </a:ext>
+            </a:extLst>
+          </p:cNvPr>
+          <p:cNvPicPr>
+            <a:picLocks noChangeAspect="1"/>
+          </p:cNvPicPr>
+          <p:nvPr/>
+        </p:nvPicPr>
+        <p:blipFill>
+          <a:blip r:embed="rId2">
+            <a:extLst>
+              <a:ext uri="{28A0092B-C50C-407E-A947-70E740481C1C}">
+                <a14:useLocalDpi xmlns:a14="http://schemas.microsoft.com/office/drawing/2010/main" val="0"/>
+              </a:ext>
+            </a:extLst>
+          </a:blip>
+          <a:stretch>
+            <a:fillRect/>
+          </a:stretch>
+        </p:blipFill>
+        <p:spPr>
+          <a:xfrm>
+            <a:off x="1524000" y="0"/>
+            <a:ext cx="9144000" cy="6858000"/>
+          </a:xfrm>
+          <a:prstGeom prst="rect">
+            <a:avLst/>
+          </a:prstGeom>
+        </p:spPr>
+      </p:pic>
+    </p:spTree>
+    <p:extLst>
+      <p:ext uri="{BB962C8B-B14F-4D97-AF65-F5344CB8AC3E}">
+        <p14:creationId xmlns:p14="http://schemas.microsoft.com/office/powerpoint/2010/main" val="3801482879"/>
+      </p:ext>
+    </p:extLst>
+  </p:cSld>
+  <p:clrMapOvr>
+    <a:masterClrMapping/>
+  </p:clrMapOvr>
+</p:sld>
+</file>
+
+<file path=ppt/slides/slide23.xml><?xml version="1.0" encoding="utf-8"?>
+<p:sld xmlns:a="http://schemas.openxmlformats.org/drawingml/2006/main" xmlns:r="http://schemas.openxmlformats.org/officeDocument/2006/relationships" xmlns:p="http://schemas.openxmlformats.org/presentationml/2006/main">
+  <p:cSld>
+    <p:spTree>
+      <p:nvGrpSpPr>
+        <p:cNvPr id="1" name=""/>
+        <p:cNvGrpSpPr/>
+        <p:nvPr/>
+      </p:nvGrpSpPr>
+      <p:grpSpPr>
+        <a:xfrm>
+          <a:off x="0" y="0"/>
+          <a:ext cx="0" cy="0"/>
+          <a:chOff x="0" y="0"/>
+          <a:chExt cx="0" cy="0"/>
+        </a:xfrm>
+      </p:grpSpPr>
+      <p:pic>
+        <p:nvPicPr>
+          <p:cNvPr id="3" name="Picture 2" descr="Chart, scatter chart&#10;&#10;Description automatically generated">
+            <a:extLst>
+              <a:ext uri="{FF2B5EF4-FFF2-40B4-BE49-F238E27FC236}">
+                <a16:creationId xmlns:a16="http://schemas.microsoft.com/office/drawing/2014/main" id="{F2F2AA3B-09F2-44AB-B60C-9CDCDCF7035E}"/>
+              </a:ext>
+            </a:extLst>
+          </p:cNvPr>
+          <p:cNvPicPr>
+            <a:picLocks noChangeAspect="1"/>
+          </p:cNvPicPr>
+          <p:nvPr/>
+        </p:nvPicPr>
+        <p:blipFill>
+          <a:blip r:embed="rId2">
+            <a:extLst>
+              <a:ext uri="{28A0092B-C50C-407E-A947-70E740481C1C}">
+                <a14:useLocalDpi xmlns:a14="http://schemas.microsoft.com/office/drawing/2010/main" val="0"/>
+              </a:ext>
+            </a:extLst>
+          </a:blip>
+          <a:stretch>
+            <a:fillRect/>
+          </a:stretch>
+        </p:blipFill>
+        <p:spPr>
+          <a:xfrm>
+            <a:off x="1524000" y="0"/>
+            <a:ext cx="9144000" cy="6858000"/>
+          </a:xfrm>
+          <a:prstGeom prst="rect">
+            <a:avLst/>
+          </a:prstGeom>
+        </p:spPr>
+      </p:pic>
+    </p:spTree>
+    <p:extLst>
+      <p:ext uri="{BB962C8B-B14F-4D97-AF65-F5344CB8AC3E}">
+        <p14:creationId xmlns:p14="http://schemas.microsoft.com/office/powerpoint/2010/main" val="3986304236"/>
+      </p:ext>
+    </p:extLst>
+  </p:cSld>
+  <p:clrMapOvr>
+    <a:masterClrMapping/>
+  </p:clrMapOvr>
+</p:sld>
+</file>
+
+<file path=ppt/slides/slide24.xml><?xml version="1.0" encoding="utf-8"?>
+<p:sld xmlns:a="http://schemas.openxmlformats.org/drawingml/2006/main" xmlns:r="http://schemas.openxmlformats.org/officeDocument/2006/relationships" xmlns:p="http://schemas.openxmlformats.org/presentationml/2006/main">
+  <p:cSld>
+    <p:spTree>
+      <p:nvGrpSpPr>
+        <p:cNvPr id="1" name=""/>
+        <p:cNvGrpSpPr/>
+        <p:nvPr/>
+      </p:nvGrpSpPr>
+      <p:grpSpPr>
+        <a:xfrm>
+          <a:off x="0" y="0"/>
+          <a:ext cx="0" cy="0"/>
+          <a:chOff x="0" y="0"/>
+          <a:chExt cx="0" cy="0"/>
+        </a:xfrm>
+      </p:grpSpPr>
+      <p:pic>
+        <p:nvPicPr>
+          <p:cNvPr id="3" name="Picture 2" descr="Chart, scatter chart&#10;&#10;Description automatically generated">
+            <a:extLst>
+              <a:ext uri="{FF2B5EF4-FFF2-40B4-BE49-F238E27FC236}">
+                <a16:creationId xmlns:a16="http://schemas.microsoft.com/office/drawing/2014/main" id="{AD14E395-4078-4111-B8BA-2804CFB0D7B1}"/>
+              </a:ext>
+            </a:extLst>
+          </p:cNvPr>
+          <p:cNvPicPr>
+            <a:picLocks noChangeAspect="1"/>
+          </p:cNvPicPr>
+          <p:nvPr/>
+        </p:nvPicPr>
+        <p:blipFill>
+          <a:blip r:embed="rId2">
+            <a:extLst>
+              <a:ext uri="{28A0092B-C50C-407E-A947-70E740481C1C}">
+                <a14:useLocalDpi xmlns:a14="http://schemas.microsoft.com/office/drawing/2010/main" val="0"/>
+              </a:ext>
+            </a:extLst>
+          </a:blip>
+          <a:stretch>
+            <a:fillRect/>
+          </a:stretch>
+        </p:blipFill>
+        <p:spPr>
+          <a:xfrm>
+            <a:off x="1524000" y="0"/>
+            <a:ext cx="9144000" cy="6858000"/>
+          </a:xfrm>
+          <a:prstGeom prst="rect">
+            <a:avLst/>
+          </a:prstGeom>
+        </p:spPr>
+      </p:pic>
+    </p:spTree>
+    <p:extLst>
+      <p:ext uri="{BB962C8B-B14F-4D97-AF65-F5344CB8AC3E}">
+        <p14:creationId xmlns:p14="http://schemas.microsoft.com/office/powerpoint/2010/main" val="463160565"/>
+      </p:ext>
+    </p:extLst>
+  </p:cSld>
+  <p:clrMapOvr>
+    <a:masterClrMapping/>
+  </p:clrMapOvr>
+</p:sld>
+</file>
+
+<file path=ppt/slides/slide25.xml><?xml version="1.0" encoding="utf-8"?>
+<p:sld xmlns:a="http://schemas.openxmlformats.org/drawingml/2006/main" xmlns:r="http://schemas.openxmlformats.org/officeDocument/2006/relationships" xmlns:p="http://schemas.openxmlformats.org/presentationml/2006/main">
+  <p:cSld>
+    <p:spTree>
+      <p:nvGrpSpPr>
+        <p:cNvPr id="1" name=""/>
+        <p:cNvGrpSpPr/>
+        <p:nvPr/>
+      </p:nvGrpSpPr>
+      <p:grpSpPr>
+        <a:xfrm>
+          <a:off x="0" y="0"/>
+          <a:ext cx="0" cy="0"/>
+          <a:chOff x="0" y="0"/>
+          <a:chExt cx="0" cy="0"/>
+        </a:xfrm>
+      </p:grpSpPr>
+      <p:sp>
+        <p:nvSpPr>
+          <p:cNvPr id="2" name="Title 1">
+            <a:extLst>
+              <a:ext uri="{FF2B5EF4-FFF2-40B4-BE49-F238E27FC236}">
+                <a16:creationId xmlns:a16="http://schemas.microsoft.com/office/drawing/2014/main" id="{754DC9BF-EDEF-443A-9CF2-ABDA35D63BE2}"/>
+              </a:ext>
+            </a:extLst>
+          </p:cNvPr>
+          <p:cNvSpPr>
+            <a:spLocks noGrp="1"/>
+          </p:cNvSpPr>
+          <p:nvPr>
+            <p:ph type="title"/>
+          </p:nvPr>
+        </p:nvSpPr>
+        <p:spPr/>
+        <p:txBody>
+          <a:bodyPr/>
+          <a:lstStyle/>
+          <a:p>
+            <a:pPr algn="ctr"/>
+            <a:r>
+              <a:rPr lang="en-US" dirty="0"/>
+              <a:t>The Results</a:t>
+            </a:r>
+          </a:p>
+        </p:txBody>
+      </p:sp>
+      <p:sp>
+        <p:nvSpPr>
+          <p:cNvPr id="3" name="Content Placeholder 2">
+            <a:extLst>
+              <a:ext uri="{FF2B5EF4-FFF2-40B4-BE49-F238E27FC236}">
+                <a16:creationId xmlns:a16="http://schemas.microsoft.com/office/drawing/2014/main" id="{B9FF299B-7D7C-4A42-9DA2-6C536158ADEF}"/>
+              </a:ext>
+            </a:extLst>
+          </p:cNvPr>
+          <p:cNvSpPr>
+            <a:spLocks noGrp="1"/>
+          </p:cNvSpPr>
+          <p:nvPr>
+            <p:ph idx="1"/>
+          </p:nvPr>
+        </p:nvSpPr>
+        <p:spPr/>
+        <p:txBody>
+          <a:bodyPr/>
+          <a:lstStyle/>
+          <a:p>
+            <a:r>
+              <a:rPr lang="en-US" dirty="0"/>
+              <a:t>#1 </a:t>
+            </a:r>
+          </a:p>
+          <a:p>
+            <a:r>
+              <a:rPr lang="en-US" dirty="0"/>
+              <a:t>#2</a:t>
+            </a:r>
+          </a:p>
+          <a:p>
+            <a:r>
+              <a:rPr lang="en-US" dirty="0"/>
+              <a:t>#3</a:t>
+            </a:r>
+          </a:p>
+          <a:p>
+            <a:r>
+              <a:rPr lang="en-US" dirty="0"/>
+              <a:t>#4</a:t>
+            </a:r>
+          </a:p>
+          <a:p>
+            <a:r>
+              <a:rPr lang="en-US" dirty="0"/>
+              <a:t>#5</a:t>
+            </a:r>
+          </a:p>
+          <a:p>
+            <a:r>
+              <a:rPr lang="en-US" dirty="0"/>
+              <a:t>#6</a:t>
+            </a:r>
+          </a:p>
+        </p:txBody>
+      </p:sp>
+    </p:spTree>
+    <p:extLst>
+      <p:ext uri="{BB962C8B-B14F-4D97-AF65-F5344CB8AC3E}">
+        <p14:creationId xmlns:p14="http://schemas.microsoft.com/office/powerpoint/2010/main" val="663288923"/>
       </p:ext>
     </p:extLst>
   </p:cSld>
@@ -5488,10 +6270,10 @@
       </p:grpSpPr>
       <p:pic>
         <p:nvPicPr>
-          <p:cNvPr id="3" name="Picture 2" descr="Chart, bar chart&#10;&#10;Description automatically generated">
-            <a:extLst>
-              <a:ext uri="{FF2B5EF4-FFF2-40B4-BE49-F238E27FC236}">
-                <a16:creationId xmlns:a16="http://schemas.microsoft.com/office/drawing/2014/main" id="{C18F2ED3-13B1-4C7C-88D4-E11F370AA314}"/>
+          <p:cNvPr id="4" name="Picture 3" descr="Chart, bar chart&#10;&#10;Description automatically generated">
+            <a:extLst>
+              <a:ext uri="{FF2B5EF4-FFF2-40B4-BE49-F238E27FC236}">
+                <a16:creationId xmlns:a16="http://schemas.microsoft.com/office/drawing/2014/main" id="{57853593-68B8-4774-877A-3930005426FD}"/>
               </a:ext>
             </a:extLst>
           </p:cNvPr>
@@ -5501,7 +6283,7 @@
           <p:nvPr/>
         </p:nvPicPr>
         <p:blipFill>
-          <a:blip r:embed="rId2">
+          <a:blip r:embed="rId3">
             <a:extLst>
               <a:ext uri="{28A0092B-C50C-407E-A947-70E740481C1C}">
                 <a14:useLocalDpi xmlns:a14="http://schemas.microsoft.com/office/drawing/2010/main" val="0"/>

</xml_diff>

<commit_message>
Generocity sounds like a nice place, but we want Generosity
</commit_message>
<xml_diff>
--- a/CSC 583 Project - Barrett & Bruggemann.pptx
+++ b/CSC 583 Project - Barrett & Bruggemann.pptx
@@ -827,6 +827,90 @@
     <p:extLst>
       <p:ext uri="{BB962C8B-B14F-4D97-AF65-F5344CB8AC3E}">
         <p14:creationId xmlns:p14="http://schemas.microsoft.com/office/powerpoint/2010/main" val="3954201431"/>
+      </p:ext>
+    </p:extLst>
+  </p:cSld>
+  <p:clrMapOvr>
+    <a:masterClrMapping/>
+  </p:clrMapOvr>
+</p:notes>
+</file>
+
+<file path=ppt/notesSlides/notesSlide5.xml><?xml version="1.0" encoding="utf-8"?>
+<p:notes xmlns:a="http://schemas.openxmlformats.org/drawingml/2006/main" xmlns:r="http://schemas.openxmlformats.org/officeDocument/2006/relationships" xmlns:p="http://schemas.openxmlformats.org/presentationml/2006/main">
+  <p:cSld>
+    <p:spTree>
+      <p:nvGrpSpPr>
+        <p:cNvPr id="1" name=""/>
+        <p:cNvGrpSpPr/>
+        <p:nvPr/>
+      </p:nvGrpSpPr>
+      <p:grpSpPr>
+        <a:xfrm>
+          <a:off x="0" y="0"/>
+          <a:ext cx="0" cy="0"/>
+          <a:chOff x="0" y="0"/>
+          <a:chExt cx="0" cy="0"/>
+        </a:xfrm>
+      </p:grpSpPr>
+      <p:sp>
+        <p:nvSpPr>
+          <p:cNvPr id="2" name="Slide Image Placeholder 1"/>
+          <p:cNvSpPr>
+            <a:spLocks noGrp="1" noRot="1" noChangeAspect="1"/>
+          </p:cNvSpPr>
+          <p:nvPr>
+            <p:ph type="sldImg"/>
+          </p:nvPr>
+        </p:nvSpPr>
+        <p:spPr/>
+      </p:sp>
+      <p:sp>
+        <p:nvSpPr>
+          <p:cNvPr id="3" name="Notes Placeholder 2"/>
+          <p:cNvSpPr>
+            <a:spLocks noGrp="1"/>
+          </p:cNvSpPr>
+          <p:nvPr>
+            <p:ph type="body" idx="1"/>
+          </p:nvPr>
+        </p:nvSpPr>
+        <p:spPr/>
+        <p:txBody>
+          <a:bodyPr/>
+          <a:lstStyle/>
+          <a:p>
+            <a:endParaRPr lang="en-US" dirty="0"/>
+          </a:p>
+        </p:txBody>
+      </p:sp>
+      <p:sp>
+        <p:nvSpPr>
+          <p:cNvPr id="4" name="Slide Number Placeholder 3"/>
+          <p:cNvSpPr>
+            <a:spLocks noGrp="1"/>
+          </p:cNvSpPr>
+          <p:nvPr>
+            <p:ph type="sldNum" sz="quarter" idx="5"/>
+          </p:nvPr>
+        </p:nvSpPr>
+        <p:spPr/>
+        <p:txBody>
+          <a:bodyPr/>
+          <a:lstStyle/>
+          <a:p>
+            <a:fld id="{640D81CD-90DB-4B57-BD28-08BF15DF7E5B}" type="slidenum">
+              <a:rPr lang="en-US" smtClean="0"/>
+              <a:t>25</a:t>
+            </a:fld>
+            <a:endParaRPr lang="en-US"/>
+          </a:p>
+        </p:txBody>
+      </p:sp>
+    </p:spTree>
+    <p:extLst>
+      <p:ext uri="{BB962C8B-B14F-4D97-AF65-F5344CB8AC3E}">
+        <p14:creationId xmlns:p14="http://schemas.microsoft.com/office/powerpoint/2010/main" val="404349913"/>
       </p:ext>
     </p:extLst>
   </p:cSld>
@@ -4668,10 +4752,10 @@
       </p:grpSpPr>
       <p:pic>
         <p:nvPicPr>
-          <p:cNvPr id="8" name="Picture 7" descr="Chart, bar chart&#10;&#10;Description automatically generated">
-            <a:extLst>
-              <a:ext uri="{FF2B5EF4-FFF2-40B4-BE49-F238E27FC236}">
-                <a16:creationId xmlns:a16="http://schemas.microsoft.com/office/drawing/2014/main" id="{34124AF4-A944-4218-8554-00A6652BA9FE}"/>
+          <p:cNvPr id="10" name="Picture 9" descr="Chart, bar chart&#10;&#10;Description automatically generated">
+            <a:extLst>
+              <a:ext uri="{FF2B5EF4-FFF2-40B4-BE49-F238E27FC236}">
+                <a16:creationId xmlns:a16="http://schemas.microsoft.com/office/drawing/2014/main" id="{7C352AFA-5CDE-4D69-9B65-2F70AB598156}"/>
               </a:ext>
             </a:extLst>
           </p:cNvPr>
@@ -4803,10 +4887,10 @@
       </p:sp>
       <p:pic>
         <p:nvPicPr>
-          <p:cNvPr id="6" name="Picture 5" descr="Chart, bar chart&#10;&#10;Description automatically generated">
-            <a:extLst>
-              <a:ext uri="{FF2B5EF4-FFF2-40B4-BE49-F238E27FC236}">
-                <a16:creationId xmlns:a16="http://schemas.microsoft.com/office/drawing/2014/main" id="{8B917A6D-86AE-4194-BEB6-66B507B2CC98}"/>
+          <p:cNvPr id="7" name="Picture 6" descr="Chart, bar chart&#10;&#10;Description automatically generated">
+            <a:extLst>
+              <a:ext uri="{FF2B5EF4-FFF2-40B4-BE49-F238E27FC236}">
+                <a16:creationId xmlns:a16="http://schemas.microsoft.com/office/drawing/2014/main" id="{58205C39-3AEB-46EA-BB48-CECD5DB7D2A0}"/>
               </a:ext>
             </a:extLst>
           </p:cNvPr>
@@ -4829,8 +4913,8 @@
         </p:blipFill>
         <p:spPr>
           <a:xfrm>
-            <a:off x="5713229" y="1690688"/>
-            <a:ext cx="6478771" cy="3445010"/>
+            <a:off x="5606102" y="1516911"/>
+            <a:ext cx="6585898" cy="3501974"/>
           </a:xfrm>
           <a:prstGeom prst="rect">
             <a:avLst/>
@@ -4869,10 +4953,10 @@
       </p:grpSpPr>
       <p:pic>
         <p:nvPicPr>
-          <p:cNvPr id="6" name="Picture 5" descr="Chart, bar chart&#10;&#10;Description automatically generated">
-            <a:extLst>
-              <a:ext uri="{FF2B5EF4-FFF2-40B4-BE49-F238E27FC236}">
-                <a16:creationId xmlns:a16="http://schemas.microsoft.com/office/drawing/2014/main" id="{5CFF7DC7-D548-4977-B0FA-C559BB76C2D2}"/>
+          <p:cNvPr id="8" name="Picture 7" descr="Chart, bar chart&#10;&#10;Description automatically generated">
+            <a:extLst>
+              <a:ext uri="{FF2B5EF4-FFF2-40B4-BE49-F238E27FC236}">
+                <a16:creationId xmlns:a16="http://schemas.microsoft.com/office/drawing/2014/main" id="{A5A11F32-1817-4B18-A055-84899EBEBE3E}"/>
               </a:ext>
             </a:extLst>
           </p:cNvPr>
@@ -5004,10 +5088,10 @@
       </p:sp>
       <p:pic>
         <p:nvPicPr>
-          <p:cNvPr id="5" name="Picture 4">
-            <a:extLst>
-              <a:ext uri="{FF2B5EF4-FFF2-40B4-BE49-F238E27FC236}">
-                <a16:creationId xmlns:a16="http://schemas.microsoft.com/office/drawing/2014/main" id="{F285F9EC-8225-4A08-896D-43678940F2FC}"/>
+          <p:cNvPr id="6" name="Picture 5" descr="Chart, bar chart&#10;&#10;Description automatically generated">
+            <a:extLst>
+              <a:ext uri="{FF2B5EF4-FFF2-40B4-BE49-F238E27FC236}">
+                <a16:creationId xmlns:a16="http://schemas.microsoft.com/office/drawing/2014/main" id="{09544A0B-FDA8-4A4E-8F49-82F03AD232D0}"/>
               </a:ext>
             </a:extLst>
           </p:cNvPr>
@@ -5030,8 +5114,8 @@
         </p:blipFill>
         <p:spPr>
           <a:xfrm>
-            <a:off x="5465135" y="1881432"/>
-            <a:ext cx="6726865" cy="3576932"/>
+            <a:off x="5501470" y="1690688"/>
+            <a:ext cx="6612558" cy="3516150"/>
           </a:xfrm>
           <a:prstGeom prst="rect">
             <a:avLst/>
@@ -5120,13 +5204,13 @@
           <a:p>
             <a:r>
               <a:rPr lang="en-US" dirty="0"/>
+              <a:t>Coincidence or contributor?</a:t>
+            </a:r>
+          </a:p>
+          <a:p>
+            <a:r>
+              <a:rPr lang="en-US" dirty="0"/>
               <a:t>How?</a:t>
-            </a:r>
-          </a:p>
-          <a:p>
-            <a:r>
-              <a:rPr lang="en-US" dirty="0"/>
-              <a:t>Coincidence or contributor?</a:t>
             </a:r>
           </a:p>
           <a:p>
@@ -5714,37 +5798,37 @@
           <a:p>
             <a:r>
               <a:rPr lang="en-US" dirty="0"/>
-              <a:t>#1 </a:t>
+              <a:t>#1 	GDP 					(0.7861) </a:t>
             </a:r>
           </a:p>
           <a:p>
             <a:r>
               <a:rPr lang="en-US" dirty="0"/>
-              <a:t>#2</a:t>
+              <a:t>#2	Social Assistance/Welfare 	(0.7489)</a:t>
             </a:r>
           </a:p>
           <a:p>
             <a:r>
               <a:rPr lang="en-US" dirty="0"/>
-              <a:t>#3</a:t>
+              <a:t>#3	Health				(0.7453)</a:t>
             </a:r>
           </a:p>
           <a:p>
             <a:r>
               <a:rPr lang="en-US" dirty="0"/>
-              <a:t>#4</a:t>
+              <a:t>#4	Freedom				(0.5681)</a:t>
             </a:r>
           </a:p>
           <a:p>
             <a:r>
               <a:rPr lang="en-US" dirty="0"/>
-              <a:t>#5</a:t>
+              <a:t>#5	Corruption				(0.4301)</a:t>
             </a:r>
           </a:p>
           <a:p>
             <a:r>
               <a:rPr lang="en-US" dirty="0"/>
-              <a:t>#6</a:t>
+              <a:t>#6	Generosity				(0.1825)			</a:t>
             </a:r>
           </a:p>
         </p:txBody>

</xml_diff>

<commit_message>
Added sick new intro slide
</commit_message>
<xml_diff>
--- a/CSC 583 Project - Barrett & Bruggemann.pptx
+++ b/CSC 583 Project - Barrett & Bruggemann.pptx
@@ -4142,44 +4142,216 @@
           <a:chExt cx="0" cy="0"/>
         </a:xfrm>
       </p:grpSpPr>
-      <p:sp>
-        <p:nvSpPr>
-          <p:cNvPr id="2" name="Title 1">
-            <a:extLst>
-              <a:ext uri="{FF2B5EF4-FFF2-40B4-BE49-F238E27FC236}">
-                <a16:creationId xmlns:a16="http://schemas.microsoft.com/office/drawing/2014/main" id="{B4AF1F84-9D9C-4FE9-A5A0-F1C32946B17B}"/>
-              </a:ext>
-            </a:extLst>
-          </p:cNvPr>
-          <p:cNvSpPr>
-            <a:spLocks noGrp="1"/>
-          </p:cNvSpPr>
-          <p:nvPr>
-            <p:ph type="ctrTitle"/>
+      <p:sp useBgFill="1">
+        <p:nvSpPr>
+          <p:cNvPr id="9" name="Rectangle 8">
+            <a:extLst>
+              <a:ext uri="{FF2B5EF4-FFF2-40B4-BE49-F238E27FC236}">
+                <a16:creationId xmlns:a16="http://schemas.microsoft.com/office/drawing/2014/main" id="{E91DC736-0EF8-4F87-9146-EBF1D2EE4D3D}"/>
+              </a:ext>
+              <a:ext uri="{C183D7F6-B498-43B3-948B-1728B52AA6E4}">
+                <adec:decorative xmlns:adec="http://schemas.microsoft.com/office/drawing/2017/decorative" val="1"/>
+              </a:ext>
+            </a:extLst>
+          </p:cNvPr>
+          <p:cNvSpPr>
+            <a:spLocks noGrp="1" noRot="1" noChangeAspect="1" noMove="1" noResize="1" noEditPoints="1" noAdjustHandles="1" noChangeArrowheads="1" noChangeShapeType="1" noTextEdit="1"/>
+          </p:cNvSpPr>
+          <p:nvPr>
+            <p:extLst>
+              <p:ext uri="{386F3935-93C4-4BCD-93E2-E3B085C9AB24}">
+                <p16:designElem xmlns:p16="http://schemas.microsoft.com/office/powerpoint/2015/main" val="1"/>
+              </p:ext>
+            </p:extLst>
           </p:nvPr>
         </p:nvSpPr>
         <p:spPr>
           <a:xfrm>
-            <a:off x="3204642" y="2353641"/>
-            <a:ext cx="5782716" cy="2150719"/>
+            <a:off x="0" y="0"/>
+            <a:ext cx="12192000" cy="6858000"/>
           </a:xfrm>
-          <a:noFill/>
+          <a:prstGeom prst="rect">
+            <a:avLst/>
+          </a:prstGeom>
+          <a:ln>
+            <a:noFill/>
+          </a:ln>
         </p:spPr>
-        <p:txBody>
-          <a:bodyPr anchor="ctr">
+        <p:style>
+          <a:lnRef idx="2">
+            <a:schemeClr val="accent1">
+              <a:shade val="50000"/>
+            </a:schemeClr>
+          </a:lnRef>
+          <a:fillRef idx="1">
+            <a:schemeClr val="accent1"/>
+          </a:fillRef>
+          <a:effectRef idx="0">
+            <a:schemeClr val="accent1"/>
+          </a:effectRef>
+          <a:fontRef idx="minor">
+            <a:schemeClr val="lt1"/>
+          </a:fontRef>
+        </p:style>
+        <p:txBody>
+          <a:bodyPr rtlCol="0" anchor="ctr"/>
+          <a:lstStyle/>
+          <a:p>
+            <a:pPr algn="ctr"/>
+            <a:endParaRPr lang="en-US"/>
+          </a:p>
+        </p:txBody>
+      </p:sp>
+      <p:pic>
+        <p:nvPicPr>
+          <p:cNvPr id="5" name="Picture 4" descr="The planet earth taken from the outer space">
+            <a:extLst>
+              <a:ext uri="{FF2B5EF4-FFF2-40B4-BE49-F238E27FC236}">
+                <a16:creationId xmlns:a16="http://schemas.microsoft.com/office/drawing/2014/main" id="{FBBA2DF7-F636-41BF-86B9-3EE9C8493388}"/>
+              </a:ext>
+            </a:extLst>
+          </p:cNvPr>
+          <p:cNvPicPr>
+            <a:picLocks noChangeAspect="1"/>
+          </p:cNvPicPr>
+          <p:nvPr/>
+        </p:nvPicPr>
+        <p:blipFill rotWithShape="1">
+          <a:blip r:embed="rId2"/>
+          <a:srcRect l="17524" r="1" b="1"/>
+          <a:stretch/>
+        </p:blipFill>
+        <p:spPr>
+          <a:xfrm>
+            <a:off x="3523488" y="10"/>
+            <a:ext cx="8668512" cy="6857990"/>
+          </a:xfrm>
+          <a:prstGeom prst="rect">
+            <a:avLst/>
+          </a:prstGeom>
+        </p:spPr>
+      </p:pic>
+      <p:sp>
+        <p:nvSpPr>
+          <p:cNvPr id="11" name="Rectangle 10">
+            <a:extLst>
+              <a:ext uri="{FF2B5EF4-FFF2-40B4-BE49-F238E27FC236}">
+                <a16:creationId xmlns:a16="http://schemas.microsoft.com/office/drawing/2014/main" id="{097CD68E-23E3-4007-8847-CD0944C4F7BE}"/>
+              </a:ext>
+              <a:ext uri="{C183D7F6-B498-43B3-948B-1728B52AA6E4}">
+                <adec:decorative xmlns:adec="http://schemas.microsoft.com/office/drawing/2017/decorative" val="1"/>
+              </a:ext>
+            </a:extLst>
+          </p:cNvPr>
+          <p:cNvSpPr>
+            <a:spLocks noGrp="1" noRot="1" noChangeAspect="1" noMove="1" noResize="1" noEditPoints="1" noAdjustHandles="1" noChangeArrowheads="1" noChangeShapeType="1" noTextEdit="1"/>
+          </p:cNvSpPr>
+          <p:nvPr>
+            <p:extLst>
+              <p:ext uri="{386F3935-93C4-4BCD-93E2-E3B085C9AB24}">
+                <p16:designElem xmlns:p16="http://schemas.microsoft.com/office/powerpoint/2015/main" val="1"/>
+              </p:ext>
+            </p:extLst>
+          </p:nvPr>
+        </p:nvSpPr>
+        <p:spPr>
+          <a:xfrm>
+            <a:off x="0" y="0"/>
+            <a:ext cx="9756601" cy="6858000"/>
+          </a:xfrm>
+          <a:prstGeom prst="rect">
+            <a:avLst/>
+          </a:prstGeom>
+          <a:gradFill>
+            <a:gsLst>
+              <a:gs pos="58000">
+                <a:schemeClr val="bg1"/>
+              </a:gs>
+              <a:gs pos="35000">
+                <a:schemeClr val="bg1">
+                  <a:alpha val="79000"/>
+                </a:schemeClr>
+              </a:gs>
+              <a:gs pos="19000">
+                <a:schemeClr val="bg1">
+                  <a:alpha val="38000"/>
+                </a:schemeClr>
+              </a:gs>
+              <a:gs pos="0">
+                <a:schemeClr val="bg1">
+                  <a:alpha val="0"/>
+                </a:schemeClr>
+              </a:gs>
+              <a:gs pos="100000">
+                <a:schemeClr val="bg1"/>
+              </a:gs>
+            </a:gsLst>
+            <a:lin ang="10800000" scaled="0"/>
+          </a:gradFill>
+          <a:ln>
+            <a:noFill/>
+          </a:ln>
+        </p:spPr>
+        <p:style>
+          <a:lnRef idx="2">
+            <a:schemeClr val="accent1">
+              <a:shade val="50000"/>
+            </a:schemeClr>
+          </a:lnRef>
+          <a:fillRef idx="1">
+            <a:schemeClr val="accent1"/>
+          </a:fillRef>
+          <a:effectRef idx="0">
+            <a:schemeClr val="accent1"/>
+          </a:effectRef>
+          <a:fontRef idx="minor">
+            <a:schemeClr val="lt1"/>
+          </a:fontRef>
+        </p:style>
+        <p:txBody>
+          <a:bodyPr rtlCol="0" anchor="ctr"/>
+          <a:lstStyle/>
+          <a:p>
+            <a:pPr algn="ctr"/>
+            <a:endParaRPr lang="en-US" dirty="0"/>
+          </a:p>
+        </p:txBody>
+      </p:sp>
+      <p:sp>
+        <p:nvSpPr>
+          <p:cNvPr id="2" name="Title 1">
+            <a:extLst>
+              <a:ext uri="{FF2B5EF4-FFF2-40B4-BE49-F238E27FC236}">
+                <a16:creationId xmlns:a16="http://schemas.microsoft.com/office/drawing/2014/main" id="{B4AF1F84-9D9C-4FE9-A5A0-F1C32946B17B}"/>
+              </a:ext>
+            </a:extLst>
+          </p:cNvPr>
+          <p:cNvSpPr>
+            <a:spLocks noGrp="1"/>
+          </p:cNvSpPr>
+          <p:nvPr>
+            <p:ph type="ctrTitle"/>
+          </p:nvPr>
+        </p:nvSpPr>
+        <p:spPr>
+          <a:xfrm>
+            <a:off x="477980" y="3317358"/>
+            <a:ext cx="8134391" cy="1009138"/>
+          </a:xfrm>
+        </p:spPr>
+        <p:txBody>
+          <a:bodyPr anchor="b">
             <a:normAutofit/>
           </a:bodyPr>
           <a:lstStyle/>
           <a:p>
-            <a:r>
-              <a:rPr lang="en-US" sz="3600" dirty="0">
-                <a:solidFill>
-                  <a:srgbClr val="080808"/>
-                </a:solidFill>
+            <a:pPr algn="l"/>
+            <a:r>
+              <a:rPr lang="en-US" sz="4800" dirty="0">
                 <a:latin typeface="Times New Roman" panose="02020603050405020304" pitchFamily="18" charset="0"/>
                 <a:cs typeface="Times New Roman" panose="02020603050405020304" pitchFamily="18" charset="0"/>
               </a:rPr>
-              <a:t>Smile Factors</a:t>
+              <a:t>What Makes The World Happy</a:t>
             </a:r>
           </a:p>
         </p:txBody>
@@ -4202,22 +4374,18 @@
         </p:nvSpPr>
         <p:spPr>
           <a:xfrm>
-            <a:off x="4439633" y="4518923"/>
-            <a:ext cx="3312734" cy="1141851"/>
+            <a:off x="278519" y="4568481"/>
+            <a:ext cx="4313760" cy="1208141"/>
           </a:xfrm>
-          <a:noFill/>
         </p:spPr>
         <p:txBody>
           <a:bodyPr>
-            <a:normAutofit fontScale="70000" lnSpcReduction="20000"/>
+            <a:normAutofit/>
           </a:bodyPr>
           <a:lstStyle/>
           <a:p>
             <a:r>
-              <a:rPr lang="en-US" sz="2000" dirty="0">
-                <a:solidFill>
-                  <a:srgbClr val="080808"/>
-                </a:solidFill>
+              <a:rPr lang="en-US" sz="1400" dirty="0">
                 <a:latin typeface="Times New Roman" panose="02020603050405020304" pitchFamily="18" charset="0"/>
                 <a:cs typeface="Times New Roman" panose="02020603050405020304" pitchFamily="18" charset="0"/>
               </a:rPr>
@@ -4226,10 +4394,7 @@
           </a:p>
           <a:p>
             <a:r>
-              <a:rPr lang="en-US" sz="2000" dirty="0">
-                <a:solidFill>
-                  <a:srgbClr val="080808"/>
-                </a:solidFill>
+              <a:rPr lang="en-US" sz="1400" dirty="0">
                 <a:latin typeface="Times New Roman" panose="02020603050405020304" pitchFamily="18" charset="0"/>
                 <a:cs typeface="Times New Roman" panose="02020603050405020304" pitchFamily="18" charset="0"/>
               </a:rPr>
@@ -4238,40 +4403,189 @@
           </a:p>
           <a:p>
             <a:r>
-              <a:rPr lang="en-US" sz="2000" dirty="0">
-                <a:solidFill>
-                  <a:srgbClr val="080808"/>
-                </a:solidFill>
+              <a:rPr lang="en-US" sz="1400" dirty="0">
                 <a:latin typeface="Times New Roman" panose="02020603050405020304" pitchFamily="18" charset="0"/>
                 <a:cs typeface="Times New Roman" panose="02020603050405020304" pitchFamily="18" charset="0"/>
               </a:rPr>
               <a:t>Charles Ryan Barrett &amp; Ryan </a:t>
             </a:r>
             <a:r>
-              <a:rPr lang="en-US" sz="2000" dirty="0" err="1">
-                <a:solidFill>
-                  <a:srgbClr val="080808"/>
-                </a:solidFill>
+              <a:rPr lang="en-US" sz="1400" dirty="0" err="1">
                 <a:latin typeface="Times New Roman" panose="02020603050405020304" pitchFamily="18" charset="0"/>
                 <a:cs typeface="Times New Roman" panose="02020603050405020304" pitchFamily="18" charset="0"/>
               </a:rPr>
               <a:t>Bruggemann</a:t>
             </a:r>
-            <a:endParaRPr lang="en-US" sz="2000" dirty="0">
-              <a:solidFill>
-                <a:srgbClr val="080808"/>
-              </a:solidFill>
+            <a:endParaRPr lang="en-US" sz="1400" dirty="0">
               <a:latin typeface="Times New Roman" panose="02020603050405020304" pitchFamily="18" charset="0"/>
               <a:cs typeface="Times New Roman" panose="02020603050405020304" pitchFamily="18" charset="0"/>
             </a:endParaRPr>
           </a:p>
           <a:p>
-            <a:endParaRPr lang="en-US" sz="2000" dirty="0">
-              <a:solidFill>
-                <a:srgbClr val="080808"/>
-              </a:solidFill>
+            <a:endParaRPr lang="en-US" sz="1400" dirty="0">
               <a:latin typeface="Times New Roman" panose="02020603050405020304" pitchFamily="18" charset="0"/>
               <a:cs typeface="Times New Roman" panose="02020603050405020304" pitchFamily="18" charset="0"/>
+            </a:endParaRPr>
+          </a:p>
+        </p:txBody>
+      </p:sp>
+      <p:sp>
+        <p:nvSpPr>
+          <p:cNvPr id="13" name="Rectangle 12">
+            <a:extLst>
+              <a:ext uri="{FF2B5EF4-FFF2-40B4-BE49-F238E27FC236}">
+                <a16:creationId xmlns:a16="http://schemas.microsoft.com/office/drawing/2014/main" id="{AF2F604E-43BE-4DC3-B983-E071523364F8}"/>
+              </a:ext>
+              <a:ext uri="{C183D7F6-B498-43B3-948B-1728B52AA6E4}">
+                <adec:decorative xmlns:adec="http://schemas.microsoft.com/office/drawing/2017/decorative" val="1"/>
+              </a:ext>
+            </a:extLst>
+          </p:cNvPr>
+          <p:cNvSpPr>
+            <a:spLocks noGrp="1" noRot="1" noChangeAspect="1" noMove="1" noResize="1" noEditPoints="1" noAdjustHandles="1" noChangeArrowheads="1" noChangeShapeType="1" noTextEdit="1"/>
+          </p:cNvSpPr>
+          <p:nvPr>
+            <p:extLst>
+              <p:ext uri="{386F3935-93C4-4BCD-93E2-E3B085C9AB24}">
+                <p16:designElem xmlns:p16="http://schemas.microsoft.com/office/powerpoint/2015/main" val="1"/>
+              </p:ext>
+            </p:extLst>
+          </p:nvPr>
+        </p:nvSpPr>
+        <p:spPr>
+          <a:xfrm rot="5400000">
+            <a:off x="759921" y="346791"/>
+            <a:ext cx="146304" cy="704088"/>
+          </a:xfrm>
+          <a:prstGeom prst="rect">
+            <a:avLst/>
+          </a:prstGeom>
+          <a:solidFill>
+            <a:schemeClr val="accent2"/>
+          </a:solidFill>
+          <a:ln>
+            <a:noFill/>
+          </a:ln>
+        </p:spPr>
+        <p:style>
+          <a:lnRef idx="2">
+            <a:schemeClr val="accent1">
+              <a:shade val="50000"/>
+            </a:schemeClr>
+          </a:lnRef>
+          <a:fillRef idx="1">
+            <a:schemeClr val="accent1"/>
+          </a:fillRef>
+          <a:effectRef idx="0">
+            <a:schemeClr val="accent1"/>
+          </a:effectRef>
+          <a:fontRef idx="minor">
+            <a:schemeClr val="lt1"/>
+          </a:fontRef>
+        </p:style>
+        <p:txBody>
+          <a:bodyPr rtlCol="0" anchor="ctr"/>
+          <a:lstStyle/>
+          <a:p>
+            <a:pPr algn="ctr"/>
+            <a:endParaRPr lang="en-US">
+              <a:solidFill>
+                <a:prstClr val="white"/>
+              </a:solidFill>
+              <a:latin typeface="Calibri" panose="020F0502020204030204"/>
+            </a:endParaRPr>
+          </a:p>
+        </p:txBody>
+      </p:sp>
+      <p:sp>
+        <p:nvSpPr>
+          <p:cNvPr id="15" name="Rectangle 14">
+            <a:extLst>
+              <a:ext uri="{FF2B5EF4-FFF2-40B4-BE49-F238E27FC236}">
+                <a16:creationId xmlns:a16="http://schemas.microsoft.com/office/drawing/2014/main" id="{08C9B587-E65E-4B52-B37C-ABEBB6E87928}"/>
+              </a:ext>
+              <a:ext uri="{C183D7F6-B498-43B3-948B-1728B52AA6E4}">
+                <adec:decorative xmlns:adec="http://schemas.microsoft.com/office/drawing/2017/decorative" val="1"/>
+              </a:ext>
+            </a:extLst>
+          </p:cNvPr>
+          <p:cNvSpPr>
+            <a:spLocks noGrp="1" noRot="1" noChangeAspect="1" noMove="1" noResize="1" noEditPoints="1" noAdjustHandles="1" noChangeArrowheads="1" noChangeShapeType="1" noTextEdit="1"/>
+          </p:cNvSpPr>
+          <p:nvPr>
+            <p:extLst>
+              <p:ext uri="{386F3935-93C4-4BCD-93E2-E3B085C9AB24}">
+                <p16:designElem xmlns:p16="http://schemas.microsoft.com/office/powerpoint/2015/main" val="1"/>
+              </p:ext>
+            </p:extLst>
+          </p:nvPr>
+        </p:nvSpPr>
+        <p:spPr>
+          <a:xfrm>
+            <a:off x="481029" y="4546920"/>
+            <a:ext cx="3977640" cy="18288"/>
+          </a:xfrm>
+          <a:prstGeom prst="rect">
+            <a:avLst/>
+          </a:prstGeom>
+          <a:solidFill>
+            <a:srgbClr val="D5D5D5"/>
+          </a:solidFill>
+          <a:ln w="3175">
+            <a:noFill/>
+          </a:ln>
+          <a:effectLst/>
+        </p:spPr>
+        <p:style>
+          <a:lnRef idx="2">
+            <a:schemeClr val="accent1">
+              <a:shade val="50000"/>
+            </a:schemeClr>
+          </a:lnRef>
+          <a:fillRef idx="1">
+            <a:schemeClr val="accent1"/>
+          </a:fillRef>
+          <a:effectRef idx="0">
+            <a:schemeClr val="accent1"/>
+          </a:effectRef>
+          <a:fontRef idx="minor">
+            <a:schemeClr val="lt1"/>
+          </a:fontRef>
+        </p:style>
+        <p:txBody>
+          <a:bodyPr rtlCol="0" anchor="ctr"/>
+          <a:lstStyle/>
+          <a:p>
+            <a:pPr marL="0" marR="0" lvl="0" indent="0" algn="ctr" defTabSz="914400" rtl="0" eaLnBrk="1" fontAlgn="auto" latinLnBrk="0" hangingPunct="1">
+              <a:lnSpc>
+                <a:spcPct val="100000"/>
+              </a:lnSpc>
+              <a:spcBef>
+                <a:spcPts val="0"/>
+              </a:spcBef>
+              <a:spcAft>
+                <a:spcPts val="0"/>
+              </a:spcAft>
+              <a:buClrTx/>
+              <a:buSzTx/>
+              <a:buFontTx/>
+              <a:buNone/>
+              <a:tabLst/>
+              <a:defRPr/>
+            </a:pPr>
+            <a:endParaRPr kumimoji="0" lang="en-US" sz="1800" b="0" i="0" u="none" strike="noStrike" kern="1200" cap="none" spc="0" normalizeH="0" baseline="0" noProof="0">
+              <a:ln>
+                <a:noFill/>
+              </a:ln>
+              <a:solidFill>
+                <a:prstClr val="white"/>
+              </a:solidFill>
+              <a:effectLst/>
+              <a:uLnTx/>
+              <a:uFillTx/>
+              <a:latin typeface="Calibri" panose="020F0502020204030204"/>
+              <a:ea typeface="+mn-ea"/>
+              <a:cs typeface="+mn-cs"/>
             </a:endParaRPr>
           </a:p>
         </p:txBody>

</xml_diff>